<commit_message>
GPF Presentation - 6th March 2018
</commit_message>
<xml_diff>
--- a/GPF-Presentation1.pptx
+++ b/GPF-Presentation1.pptx
@@ -19,11 +19,16 @@
   <p:notesSz cx="6858000" cy="9144000"/>
   <p:embeddedFontLst>
     <p:embeddedFont>
-      <p:font typeface="Open Sans"/>
+      <p:font typeface="Caveat"/>
       <p:regular r:id="rId11"/>
       <p:bold r:id="rId12"/>
-      <p:italic r:id="rId13"/>
-      <p:boldItalic r:id="rId14"/>
+    </p:embeddedFont>
+    <p:embeddedFont>
+      <p:font typeface="Open Sans"/>
+      <p:regular r:id="rId13"/>
+      <p:bold r:id="rId14"/>
+      <p:italic r:id="rId15"/>
+      <p:boldItalic r:id="rId16"/>
     </p:embeddedFont>
   </p:embeddedFontLst>
   <p:defaultTextStyle>
@@ -1109,49 +1114,6 @@
       <p:sp>
         <p:nvSpPr>
           <p:cNvPr id="258" name="Shape 258"/>
-          <p:cNvSpPr txBox="1"/>
-          <p:nvPr>
-            <p:ph idx="1" type="body"/>
-          </p:nvPr>
-        </p:nvSpPr>
-        <p:spPr>
-          <a:xfrm>
-            <a:off x="685800" y="4343400"/>
-            <a:ext cx="5486400" cy="4114800"/>
-          </a:xfrm>
-          <a:prstGeom prst="rect">
-            <a:avLst/>
-          </a:prstGeom>
-          <a:noFill/>
-          <a:ln>
-            <a:noFill/>
-          </a:ln>
-        </p:spPr>
-        <p:txBody>
-          <a:bodyPr anchorCtr="0" anchor="ctr" bIns="91425" lIns="91425" spcFirstLastPara="1" rIns="91425" wrap="square" tIns="91425">
-            <a:noAutofit/>
-          </a:bodyPr>
-          <a:lstStyle/>
-          <a:p>
-            <a:pPr indent="0" lvl="0" marL="0">
-              <a:spcBef>
-                <a:spcPts val="0"/>
-              </a:spcBef>
-              <a:spcAft>
-                <a:spcPts val="0"/>
-              </a:spcAft>
-              <a:buNone/>
-            </a:pPr>
-            <a:r>
-              <a:t/>
-            </a:r>
-            <a:endParaRPr/>
-          </a:p>
-        </p:txBody>
-      </p:sp>
-      <p:sp>
-        <p:nvSpPr>
-          <p:cNvPr id="259" name="Shape 259"/>
           <p:cNvSpPr/>
           <p:nvPr>
             <p:ph idx="2" type="sldImg"/>
@@ -1160,7 +1122,7 @@
         <p:spPr>
           <a:xfrm>
             <a:off x="1143225" y="685800"/>
-            <a:ext cx="4572225" cy="3429000"/>
+            <a:ext cx="4572300" cy="3429000"/>
           </a:xfrm>
           <a:custGeom>
             <a:pathLst>
@@ -1182,6 +1144,45 @@
             </a:pathLst>
           </a:custGeom>
         </p:spPr>
+      </p:sp>
+      <p:sp>
+        <p:nvSpPr>
+          <p:cNvPr id="259" name="Shape 259"/>
+          <p:cNvSpPr txBox="1"/>
+          <p:nvPr>
+            <p:ph idx="1" type="body"/>
+          </p:nvPr>
+        </p:nvSpPr>
+        <p:spPr>
+          <a:xfrm>
+            <a:off x="685800" y="4343400"/>
+            <a:ext cx="5486400" cy="4114800"/>
+          </a:xfrm>
+          <a:prstGeom prst="rect">
+            <a:avLst/>
+          </a:prstGeom>
+        </p:spPr>
+        <p:txBody>
+          <a:bodyPr anchorCtr="0" anchor="t" bIns="91425" lIns="91425" spcFirstLastPara="1" rIns="91425" wrap="square" tIns="91425">
+            <a:noAutofit/>
+          </a:bodyPr>
+          <a:lstStyle/>
+          <a:p>
+            <a:pPr indent="0" lvl="0" marL="0">
+              <a:spcBef>
+                <a:spcPts val="0"/>
+              </a:spcBef>
+              <a:spcAft>
+                <a:spcPts val="0"/>
+              </a:spcAft>
+              <a:buNone/>
+            </a:pPr>
+            <a:r>
+              <a:t/>
+            </a:r>
+            <a:endParaRPr/>
+          </a:p>
+        </p:txBody>
       </p:sp>
     </p:spTree>
   </p:cSld>
@@ -19336,36 +19337,9 @@
           <a:chExt cx="0" cy="0"/>
         </a:xfrm>
       </p:grpSpPr>
-      <p:pic>
-        <p:nvPicPr>
-          <p:cNvPr id="81" name="Shape 81"/>
-          <p:cNvPicPr preferRelativeResize="0"/>
-          <p:nvPr/>
-        </p:nvPicPr>
-        <p:blipFill rotWithShape="1">
-          <a:blip r:embed="rId2">
-            <a:alphaModFix/>
-          </a:blip>
-          <a:srcRect b="0" l="0" r="0" t="0"/>
-          <a:stretch/>
-        </p:blipFill>
-        <p:spPr>
-          <a:xfrm>
-            <a:off x="8687567" y="388310"/>
-            <a:ext cx="2230905" cy="664275"/>
-          </a:xfrm>
-          <a:prstGeom prst="rect">
-            <a:avLst/>
-          </a:prstGeom>
-          <a:noFill/>
-          <a:ln>
-            <a:noFill/>
-          </a:ln>
-        </p:spPr>
-      </p:pic>
       <p:sp>
         <p:nvSpPr>
-          <p:cNvPr id="82" name="Shape 82"/>
+          <p:cNvPr id="81" name="Shape 81"/>
           <p:cNvSpPr txBox="1"/>
           <p:nvPr>
             <p:ph type="title"/>
@@ -19492,7 +19466,7 @@
       </p:sp>
       <p:sp>
         <p:nvSpPr>
-          <p:cNvPr id="83" name="Shape 83"/>
+          <p:cNvPr id="82" name="Shape 82"/>
           <p:cNvSpPr txBox="1"/>
           <p:nvPr>
             <p:ph idx="1" type="body"/>
@@ -19619,7 +19593,7 @@
       </p:sp>
       <p:sp>
         <p:nvSpPr>
-          <p:cNvPr id="84" name="Shape 84"/>
+          <p:cNvPr id="83" name="Shape 83"/>
           <p:cNvSpPr txBox="1"/>
           <p:nvPr>
             <p:ph idx="10" type="dt"/>
@@ -19746,7 +19720,7 @@
       </p:sp>
       <p:sp>
         <p:nvSpPr>
-          <p:cNvPr id="85" name="Shape 85"/>
+          <p:cNvPr id="84" name="Shape 84"/>
           <p:cNvSpPr txBox="1"/>
           <p:nvPr>
             <p:ph idx="11" type="ftr"/>
@@ -19873,7 +19847,7 @@
       </p:sp>
       <p:sp>
         <p:nvSpPr>
-          <p:cNvPr id="86" name="Shape 86"/>
+          <p:cNvPr id="85" name="Shape 85"/>
           <p:cNvSpPr txBox="1"/>
           <p:nvPr>
             <p:ph idx="12" type="sldNum"/>
@@ -20086,6 +20060,34 @@
           </a:p>
         </p:txBody>
       </p:sp>
+      <p:pic>
+        <p:nvPicPr>
+          <p:cNvPr id="86" name="Shape 86"/>
+          <p:cNvPicPr preferRelativeResize="0"/>
+          <p:nvPr/>
+        </p:nvPicPr>
+        <p:blipFill>
+          <a:blip r:embed="rId2">
+            <a:alphaModFix/>
+          </a:blip>
+          <a:stretch>
+            <a:fillRect/>
+          </a:stretch>
+        </p:blipFill>
+        <p:spPr>
+          <a:xfrm>
+            <a:off x="9392300" y="46050"/>
+            <a:ext cx="2335950" cy="889825"/>
+          </a:xfrm>
+          <a:prstGeom prst="rect">
+            <a:avLst/>
+          </a:prstGeom>
+          <a:noFill/>
+          <a:ln>
+            <a:noFill/>
+          </a:ln>
+        </p:spPr>
+      </p:pic>
     </p:spTree>
   </p:cSld>
   <p:clrMap accent1="accent1" accent2="accent2" accent3="accent3" accent4="accent4" accent5="accent5" accent6="accent6" bg1="lt1" bg2="dk2" tx1="dk1" tx2="lt2" folHlink="folHlink" hlink="hlink"/>
@@ -20821,7 +20823,7 @@
         </p:nvSpPr>
         <p:spPr>
           <a:xfrm>
-            <a:off x="1778825" y="994525"/>
+            <a:off x="1778825" y="842125"/>
             <a:ext cx="8579100" cy="3000000"/>
           </a:xfrm>
           <a:prstGeom prst="rect">
@@ -21058,7 +21060,7 @@
         </p:nvSpPr>
         <p:spPr>
           <a:xfrm>
-            <a:off x="1757250" y="4727150"/>
+            <a:off x="1757250" y="4574750"/>
             <a:ext cx="8579100" cy="1843200"/>
           </a:xfrm>
           <a:prstGeom prst="rect">
@@ -21117,9 +21119,21 @@
                 <a:cs typeface="Calibri"/>
                 <a:sym typeface="Calibri"/>
               </a:rPr>
-              <a:t>Presenters : Dr. Muzzamil Aziz</a:t>
+              <a:t> Dr. Muzzamil Aziz </a:t>
             </a:r>
-            <a:endParaRPr sz="2400">
+            <a:r>
+              <a:rPr lang="en-US" sz="1800">
+                <a:solidFill>
+                  <a:schemeClr val="dk1"/>
+                </a:solidFill>
+                <a:latin typeface="Calibri"/>
+                <a:ea typeface="Calibri"/>
+                <a:cs typeface="Calibri"/>
+                <a:sym typeface="Calibri"/>
+              </a:rPr>
+              <a:t>(maziz@gwdg.de)</a:t>
+            </a:r>
+            <a:endParaRPr sz="1800">
               <a:solidFill>
                 <a:schemeClr val="dk1"/>
               </a:solidFill>
@@ -21149,9 +21163,21 @@
                 <a:cs typeface="Calibri"/>
                 <a:sym typeface="Calibri"/>
               </a:rPr>
-              <a:t>                   Amirreza Fazely</a:t>
+              <a:t>Amirreza Fazely </a:t>
             </a:r>
-            <a:endParaRPr sz="2400">
+            <a:r>
+              <a:rPr lang="en-US" sz="1800">
+                <a:solidFill>
+                  <a:schemeClr val="dk1"/>
+                </a:solidFill>
+                <a:latin typeface="Calibri"/>
+                <a:ea typeface="Calibri"/>
+                <a:cs typeface="Calibri"/>
+                <a:sym typeface="Calibri"/>
+              </a:rPr>
+              <a:t>(afazely@gwdg.de)</a:t>
+            </a:r>
+            <a:endParaRPr sz="1800">
               <a:solidFill>
                 <a:schemeClr val="dk1"/>
               </a:solidFill>
@@ -21204,7 +21230,7 @@
                 <a:cs typeface="Calibri"/>
                 <a:sym typeface="Calibri"/>
               </a:rPr>
-              <a:t>March 6th 2018</a:t>
+              <a:t>March, 6th 2018</a:t>
             </a:r>
             <a:r>
               <a:rPr lang="en-US" sz="3600">
@@ -21711,7 +21737,7 @@
                 <a:cs typeface="Calibri"/>
                 <a:sym typeface="Calibri"/>
               </a:rPr>
-              <a:t> -  Penty manual Tasks , ex. file converting , analytical process.</a:t>
+              <a:t> -  Plenty of manual Tasks , ex. file converting , analytical process.</a:t>
             </a:r>
             <a:endParaRPr sz="1800">
               <a:solidFill>
@@ -22670,7 +22696,13 @@
             <p:cNvPicPr preferRelativeResize="0"/>
             <p:nvPr/>
           </p:nvPicPr>
-          <p:blipFill/>
+          <p:blipFill rotWithShape="1">
+            <a:blip r:embed="rId4">
+              <a:alphaModFix/>
+            </a:blip>
+            <a:srcRect b="0" l="0" r="0" t="0"/>
+            <a:stretch/>
+          </p:blipFill>
           <p:spPr>
             <a:xfrm>
               <a:off x="6151775" y="1525350"/>
@@ -23140,7 +23172,7 @@
             <p:nvPr/>
           </p:nvPicPr>
           <p:blipFill rotWithShape="1">
-            <a:blip r:embed="rId4">
+            <a:blip r:embed="rId5">
               <a:alphaModFix/>
             </a:blip>
             <a:srcRect b="0" l="0" r="0" t="0"/>
@@ -23897,7 +23929,7 @@
             <p:nvPr/>
           </p:nvPicPr>
           <p:blipFill>
-            <a:blip r:embed="rId5">
+            <a:blip r:embed="rId6">
               <a:alphaModFix/>
             </a:blip>
             <a:stretch>
@@ -23925,7 +23957,7 @@
             <p:nvPr/>
           </p:nvPicPr>
           <p:blipFill>
-            <a:blip r:embed="rId6">
+            <a:blip r:embed="rId7">
               <a:alphaModFix/>
             </a:blip>
             <a:stretch>
@@ -23953,7 +23985,7 @@
             <p:nvPr/>
           </p:nvPicPr>
           <p:blipFill>
-            <a:blip r:embed="rId7">
+            <a:blip r:embed="rId8">
               <a:alphaModFix/>
             </a:blip>
             <a:stretch>
@@ -23981,7 +24013,7 @@
             <p:nvPr/>
           </p:nvPicPr>
           <p:blipFill>
-            <a:blip r:embed="rId8">
+            <a:blip r:embed="rId9">
               <a:alphaModFix/>
             </a:blip>
             <a:stretch>
@@ -24009,7 +24041,7 @@
             <p:nvPr/>
           </p:nvPicPr>
           <p:blipFill>
-            <a:blip r:embed="rId9">
+            <a:blip r:embed="rId10">
               <a:alphaModFix/>
             </a:blip>
             <a:stretch>
@@ -24037,7 +24069,7 @@
             <p:nvPr/>
           </p:nvPicPr>
           <p:blipFill>
-            <a:blip r:embed="rId10">
+            <a:blip r:embed="rId11">
               <a:alphaModFix/>
             </a:blip>
             <a:stretch>
@@ -24065,7 +24097,7 @@
             <p:nvPr/>
           </p:nvPicPr>
           <p:blipFill>
-            <a:blip r:embed="rId11">
+            <a:blip r:embed="rId12">
               <a:alphaModFix/>
             </a:blip>
             <a:stretch>
@@ -24093,7 +24125,7 @@
             <p:nvPr/>
           </p:nvPicPr>
           <p:blipFill>
-            <a:blip r:embed="rId12">
+            <a:blip r:embed="rId13">
               <a:alphaModFix/>
             </a:blip>
             <a:stretch>
@@ -24121,7 +24153,7 @@
             <p:nvPr/>
           </p:nvPicPr>
           <p:blipFill>
-            <a:blip r:embed="rId11">
+            <a:blip r:embed="rId12">
               <a:alphaModFix/>
             </a:blip>
             <a:stretch>
@@ -24149,7 +24181,7 @@
             <p:nvPr/>
           </p:nvPicPr>
           <p:blipFill>
-            <a:blip r:embed="rId11">
+            <a:blip r:embed="rId12">
               <a:alphaModFix/>
             </a:blip>
             <a:stretch>
@@ -24177,7 +24209,7 @@
             <p:nvPr/>
           </p:nvPicPr>
           <p:blipFill>
-            <a:blip r:embed="rId11">
+            <a:blip r:embed="rId12">
               <a:alphaModFix/>
             </a:blip>
             <a:stretch>
@@ -24467,7 +24499,7 @@
             <p:nvPr/>
           </p:nvPicPr>
           <p:blipFill>
-            <a:blip r:embed="rId13">
+            <a:blip r:embed="rId14">
               <a:alphaModFix/>
             </a:blip>
             <a:stretch>
@@ -24889,7 +24921,7 @@
             <p:nvPr/>
           </p:nvPicPr>
           <p:blipFill>
-            <a:blip r:embed="rId14">
+            <a:blip r:embed="rId15">
               <a:alphaModFix/>
             </a:blip>
             <a:stretch>
@@ -24917,7 +24949,7 @@
             <p:nvPr/>
           </p:nvPicPr>
           <p:blipFill>
-            <a:blip r:embed="rId15">
+            <a:blip r:embed="rId16">
               <a:alphaModFix/>
             </a:blip>
             <a:stretch>
@@ -24945,7 +24977,7 @@
             <p:nvPr/>
           </p:nvPicPr>
           <p:blipFill>
-            <a:blip r:embed="rId15">
+            <a:blip r:embed="rId16">
               <a:alphaModFix/>
             </a:blip>
             <a:stretch>
@@ -24973,7 +25005,7 @@
             <p:nvPr/>
           </p:nvPicPr>
           <p:blipFill>
-            <a:blip r:embed="rId15">
+            <a:blip r:embed="rId16">
               <a:alphaModFix/>
             </a:blip>
             <a:stretch>
@@ -25001,7 +25033,7 @@
             <p:nvPr/>
           </p:nvPicPr>
           <p:blipFill>
-            <a:blip r:embed="rId15">
+            <a:blip r:embed="rId16">
               <a:alphaModFix/>
             </a:blip>
             <a:stretch>
@@ -25318,7 +25350,7 @@
             <p:nvPr/>
           </p:nvPicPr>
           <p:blipFill>
-            <a:blip r:embed="rId15">
+            <a:blip r:embed="rId16">
               <a:alphaModFix/>
             </a:blip>
             <a:stretch>
@@ -25372,7 +25404,7 @@
             <p:nvPr/>
           </p:nvPicPr>
           <p:blipFill>
-            <a:blip r:embed="rId14">
+            <a:blip r:embed="rId15">
               <a:alphaModFix/>
             </a:blip>
             <a:stretch>
@@ -25452,7 +25484,7 @@
             <p:nvPr/>
           </p:nvPicPr>
           <p:blipFill>
-            <a:blip r:embed="rId14">
+            <a:blip r:embed="rId15">
               <a:alphaModFix/>
             </a:blip>
             <a:stretch>
@@ -25508,7 +25540,7 @@
             <p:nvPr/>
           </p:nvPicPr>
           <p:blipFill>
-            <a:blip r:embed="rId16">
+            <a:blip r:embed="rId17">
               <a:alphaModFix/>
             </a:blip>
             <a:stretch>
@@ -25536,7 +25568,7 @@
             <p:nvPr/>
           </p:nvPicPr>
           <p:blipFill>
-            <a:blip r:embed="rId17">
+            <a:blip r:embed="rId18">
               <a:alphaModFix/>
             </a:blip>
             <a:stretch>
@@ -25849,7 +25881,7 @@
             <p:nvPr/>
           </p:nvPicPr>
           <p:blipFill>
-            <a:blip r:embed="rId18">
+            <a:blip r:embed="rId19">
               <a:alphaModFix/>
             </a:blip>
             <a:stretch>
@@ -25919,7 +25951,7 @@
             <p:nvPr/>
           </p:nvPicPr>
           <p:blipFill>
-            <a:blip r:embed="rId18">
+            <a:blip r:embed="rId19">
               <a:alphaModFix/>
             </a:blip>
             <a:stretch>
@@ -26073,7 +26105,7 @@
             <p:nvPr/>
           </p:nvPicPr>
           <p:blipFill>
-            <a:blip r:embed="rId18">
+            <a:blip r:embed="rId19">
               <a:alphaModFix/>
             </a:blip>
             <a:stretch>
@@ -26143,7 +26175,7 @@
             <p:nvPr/>
           </p:nvPicPr>
           <p:blipFill>
-            <a:blip r:embed="rId19">
+            <a:blip r:embed="rId20">
               <a:alphaModFix/>
             </a:blip>
             <a:stretch>
@@ -26171,7 +26203,7 @@
             <p:nvPr/>
           </p:nvPicPr>
           <p:blipFill>
-            <a:blip r:embed="rId20">
+            <a:blip r:embed="rId21">
               <a:alphaModFix/>
             </a:blip>
             <a:stretch>
@@ -26302,3745 +26334,412 @@
           <a:chExt cx="0" cy="0"/>
         </a:xfrm>
       </p:grpSpPr>
-      <p:grpSp>
-        <p:nvGrpSpPr>
+      <p:sp>
+        <p:nvSpPr>
           <p:cNvPr id="261" name="Shape 261"/>
-          <p:cNvGrpSpPr/>
+          <p:cNvSpPr txBox="1"/>
           <p:nvPr/>
-        </p:nvGrpSpPr>
-        <p:grpSpPr>
+        </p:nvSpPr>
+        <p:spPr>
           <a:xfrm>
-            <a:off x="578475" y="121025"/>
-            <a:ext cx="11349925" cy="6660713"/>
-            <a:chOff x="578475" y="121025"/>
-            <a:chExt cx="11349925" cy="6660713"/>
+            <a:off x="3422175" y="1705075"/>
+            <a:ext cx="4837500" cy="1029900"/>
           </a:xfrm>
-        </p:grpSpPr>
-        <p:pic>
-          <p:nvPicPr>
-            <p:cNvPr id="262" name="Shape 262"/>
-            <p:cNvPicPr preferRelativeResize="0"/>
-            <p:nvPr/>
-          </p:nvPicPr>
-          <p:blipFill>
-            <a:blip r:embed="rId3">
-              <a:alphaModFix/>
-            </a:blip>
-            <a:stretch>
-              <a:fillRect/>
-            </a:stretch>
-          </p:blipFill>
-          <p:spPr>
-            <a:xfrm>
-              <a:off x="747075" y="4399875"/>
-              <a:ext cx="862500" cy="862500"/>
-            </a:xfrm>
-            <a:prstGeom prst="rect">
-              <a:avLst/>
-            </a:prstGeom>
+          <a:prstGeom prst="rect">
+            <a:avLst/>
+          </a:prstGeom>
+          <a:noFill/>
+          <a:ln>
             <a:noFill/>
-            <a:ln>
-              <a:noFill/>
-            </a:ln>
-          </p:spPr>
-        </p:pic>
-        <p:pic>
-          <p:nvPicPr>
-            <p:cNvPr id="263" name="Shape 263"/>
-            <p:cNvPicPr preferRelativeResize="0"/>
-            <p:nvPr/>
-          </p:nvPicPr>
-          <p:blipFill/>
-          <p:spPr>
-            <a:xfrm>
-              <a:off x="6151775" y="1525350"/>
-              <a:ext cx="1966200" cy="837700"/>
-            </a:xfrm>
-            <a:prstGeom prst="rect">
-              <a:avLst/>
-            </a:prstGeom>
+          </a:ln>
+        </p:spPr>
+        <p:txBody>
+          <a:bodyPr anchorCtr="0" anchor="t" bIns="91425" lIns="91425" spcFirstLastPara="1" rIns="91425" wrap="square" tIns="91425">
+            <a:noAutofit/>
+          </a:bodyPr>
+          <a:lstStyle/>
+          <a:p>
+            <a:pPr indent="0" lvl="0" marL="0">
+              <a:spcBef>
+                <a:spcPts val="0"/>
+              </a:spcBef>
+              <a:spcAft>
+                <a:spcPts val="0"/>
+              </a:spcAft>
+              <a:buNone/>
+            </a:pPr>
+            <a:r>
+              <a:rPr lang="en-US" sz="6000">
+                <a:latin typeface="Caveat"/>
+                <a:ea typeface="Caveat"/>
+                <a:cs typeface="Caveat"/>
+                <a:sym typeface="Caveat"/>
+              </a:rPr>
+              <a:t>Thank you !</a:t>
+            </a:r>
+            <a:endParaRPr sz="6000">
+              <a:latin typeface="Caveat"/>
+              <a:ea typeface="Caveat"/>
+              <a:cs typeface="Caveat"/>
+              <a:sym typeface="Caveat"/>
+            </a:endParaRPr>
+          </a:p>
+          <a:p>
+            <a:pPr indent="0" lvl="0" marL="0">
+              <a:spcBef>
+                <a:spcPts val="0"/>
+              </a:spcBef>
+              <a:spcAft>
+                <a:spcPts val="0"/>
+              </a:spcAft>
+              <a:buNone/>
+            </a:pPr>
+            <a:r>
+              <a:t/>
+            </a:r>
+            <a:endParaRPr sz="2400">
+              <a:latin typeface="Calibri"/>
+              <a:ea typeface="Calibri"/>
+              <a:cs typeface="Calibri"/>
+              <a:sym typeface="Calibri"/>
+            </a:endParaRPr>
+          </a:p>
+          <a:p>
+            <a:pPr indent="0" lvl="0" marL="0">
+              <a:spcBef>
+                <a:spcPts val="0"/>
+              </a:spcBef>
+              <a:spcAft>
+                <a:spcPts val="0"/>
+              </a:spcAft>
+              <a:buNone/>
+            </a:pPr>
+            <a:r>
+              <a:rPr lang="en-US" sz="3600">
+                <a:latin typeface="Caveat"/>
+                <a:ea typeface="Caveat"/>
+                <a:cs typeface="Caveat"/>
+                <a:sym typeface="Caveat"/>
+              </a:rPr>
+              <a:t>Any Question or comments...</a:t>
+            </a:r>
+            <a:endParaRPr sz="3600">
+              <a:latin typeface="Caveat"/>
+              <a:ea typeface="Caveat"/>
+              <a:cs typeface="Caveat"/>
+              <a:sym typeface="Caveat"/>
+            </a:endParaRPr>
+          </a:p>
+        </p:txBody>
+      </p:sp>
+      <p:pic>
+        <p:nvPicPr>
+          <p:cNvPr id="262" name="Shape 262"/>
+          <p:cNvPicPr preferRelativeResize="0"/>
+          <p:nvPr/>
+        </p:nvPicPr>
+        <p:blipFill>
+          <a:blip r:embed="rId3">
+            <a:alphaModFix/>
+          </a:blip>
+          <a:stretch>
+            <a:fillRect/>
+          </a:stretch>
+        </p:blipFill>
+        <p:spPr>
+          <a:xfrm>
+            <a:off x="8436900" y="1683925"/>
+            <a:ext cx="2463750" cy="2463750"/>
+          </a:xfrm>
+          <a:prstGeom prst="rect">
+            <a:avLst/>
+          </a:prstGeom>
+          <a:noFill/>
+          <a:ln>
             <a:noFill/>
-            <a:ln>
-              <a:noFill/>
-            </a:ln>
-          </p:spPr>
-        </p:pic>
-        <p:sp>
-          <p:nvSpPr>
-            <p:cNvPr id="264" name="Shape 264"/>
-            <p:cNvSpPr/>
-            <p:nvPr/>
-          </p:nvSpPr>
-          <p:spPr>
-            <a:xfrm>
-              <a:off x="4423725" y="1431001"/>
-              <a:ext cx="1838400" cy="1012500"/>
-            </a:xfrm>
-            <a:prstGeom prst="roundRect">
-              <a:avLst>
-                <a:gd fmla="val 16667" name="adj"/>
-              </a:avLst>
-            </a:prstGeom>
-            <a:solidFill>
-              <a:srgbClr val="C9C9C9"/>
-            </a:solidFill>
-            <a:ln cap="flat" cmpd="sng" w="12700">
+          </a:ln>
+        </p:spPr>
+      </p:pic>
+      <p:sp>
+        <p:nvSpPr>
+          <p:cNvPr id="263" name="Shape 263"/>
+          <p:cNvSpPr txBox="1"/>
+          <p:nvPr/>
+        </p:nvSpPr>
+        <p:spPr>
+          <a:xfrm>
+            <a:off x="8363975" y="4519525"/>
+            <a:ext cx="3871500" cy="438000"/>
+          </a:xfrm>
+          <a:prstGeom prst="rect">
+            <a:avLst/>
+          </a:prstGeom>
+          <a:noFill/>
+          <a:ln>
+            <a:noFill/>
+          </a:ln>
+        </p:spPr>
+        <p:txBody>
+          <a:bodyPr anchorCtr="0" anchor="t" bIns="91425" lIns="91425" spcFirstLastPara="1" rIns="91425" wrap="square" tIns="91425">
+            <a:noAutofit/>
+          </a:bodyPr>
+          <a:lstStyle/>
+          <a:p>
+            <a:pPr indent="0" lvl="0" marL="0">
+              <a:spcBef>
+                <a:spcPts val="0"/>
+              </a:spcBef>
+              <a:spcAft>
+                <a:spcPts val="0"/>
+              </a:spcAft>
+              <a:buNone/>
+            </a:pPr>
+            <a:r>
+              <a:rPr lang="en-US">
+                <a:latin typeface="Calibri"/>
+                <a:ea typeface="Calibri"/>
+                <a:cs typeface="Calibri"/>
+                <a:sym typeface="Calibri"/>
+              </a:rPr>
+              <a:t>Presenter: Dr. Muzzamil Aziz</a:t>
+            </a:r>
+            <a:endParaRPr>
+              <a:latin typeface="Calibri"/>
+              <a:ea typeface="Calibri"/>
+              <a:cs typeface="Calibri"/>
+              <a:sym typeface="Calibri"/>
+            </a:endParaRPr>
+          </a:p>
+          <a:p>
+            <a:pPr indent="0" lvl="0" marL="0">
+              <a:spcBef>
+                <a:spcPts val="0"/>
+              </a:spcBef>
+              <a:spcAft>
+                <a:spcPts val="0"/>
+              </a:spcAft>
+              <a:buNone/>
+            </a:pPr>
+            <a:r>
+              <a:rPr lang="en-US">
+                <a:latin typeface="Calibri"/>
+                <a:ea typeface="Calibri"/>
+                <a:cs typeface="Calibri"/>
+                <a:sym typeface="Calibri"/>
+              </a:rPr>
+              <a:t>Researcher, e-Science Group, GWDG</a:t>
+            </a:r>
+            <a:endParaRPr>
+              <a:latin typeface="Calibri"/>
+              <a:ea typeface="Calibri"/>
+              <a:cs typeface="Calibri"/>
+              <a:sym typeface="Calibri"/>
+            </a:endParaRPr>
+          </a:p>
+          <a:p>
+            <a:pPr indent="0" lvl="0" marL="0">
+              <a:spcBef>
+                <a:spcPts val="0"/>
+              </a:spcBef>
+              <a:spcAft>
+                <a:spcPts val="0"/>
+              </a:spcAft>
+              <a:buNone/>
+            </a:pPr>
+            <a:r>
+              <a:rPr lang="en-US">
+                <a:latin typeface="Calibri"/>
+                <a:ea typeface="Calibri"/>
+                <a:cs typeface="Calibri"/>
+                <a:sym typeface="Calibri"/>
+              </a:rPr>
+              <a:t>mailto: maziz@gwdg.de</a:t>
+            </a:r>
+            <a:endParaRPr>
+              <a:latin typeface="Calibri"/>
+              <a:ea typeface="Calibri"/>
+              <a:cs typeface="Calibri"/>
+              <a:sym typeface="Calibri"/>
+            </a:endParaRPr>
+          </a:p>
+          <a:p>
+            <a:pPr indent="0" lvl="0" marL="0">
+              <a:spcBef>
+                <a:spcPts val="0"/>
+              </a:spcBef>
+              <a:spcAft>
+                <a:spcPts val="0"/>
+              </a:spcAft>
+              <a:buNone/>
+            </a:pPr>
+            <a:r>
+              <a:rPr lang="en-US">
+                <a:latin typeface="Calibri"/>
+                <a:ea typeface="Calibri"/>
+                <a:cs typeface="Calibri"/>
+                <a:sym typeface="Calibri"/>
+              </a:rPr>
+              <a:t>Telefon: 0551 201-2114</a:t>
+            </a:r>
+            <a:endParaRPr>
+              <a:latin typeface="Calibri"/>
+              <a:ea typeface="Calibri"/>
+              <a:cs typeface="Calibri"/>
+              <a:sym typeface="Calibri"/>
+            </a:endParaRPr>
+          </a:p>
+          <a:p>
+            <a:pPr indent="0" lvl="0" marL="0">
+              <a:spcBef>
+                <a:spcPts val="0"/>
+              </a:spcBef>
+              <a:spcAft>
+                <a:spcPts val="0"/>
+              </a:spcAft>
+              <a:buNone/>
+            </a:pPr>
+            <a:r>
+              <a:rPr lang="en-US">
+                <a:latin typeface="Calibri"/>
+                <a:ea typeface="Calibri"/>
+                <a:cs typeface="Calibri"/>
+                <a:sym typeface="Calibri"/>
+              </a:rPr>
+              <a:t>-----------------------------------------------------------------</a:t>
+            </a:r>
+            <a:endParaRPr>
+              <a:latin typeface="Calibri"/>
+              <a:ea typeface="Calibri"/>
+              <a:cs typeface="Calibri"/>
+              <a:sym typeface="Calibri"/>
+            </a:endParaRPr>
+          </a:p>
+          <a:p>
+            <a:pPr indent="0" lvl="0" marL="0">
+              <a:spcBef>
+                <a:spcPts val="0"/>
+              </a:spcBef>
+              <a:spcAft>
+                <a:spcPts val="0"/>
+              </a:spcAft>
+              <a:buNone/>
+            </a:pPr>
+            <a:r>
+              <a:rPr lang="en-US">
+                <a:latin typeface="Calibri"/>
+                <a:ea typeface="Calibri"/>
+                <a:cs typeface="Calibri"/>
+                <a:sym typeface="Calibri"/>
+              </a:rPr>
+              <a:t>GWDG - Gesellschaft für wissenschaftliche</a:t>
+            </a:r>
+            <a:endParaRPr>
+              <a:latin typeface="Calibri"/>
+              <a:ea typeface="Calibri"/>
+              <a:cs typeface="Calibri"/>
+              <a:sym typeface="Calibri"/>
+            </a:endParaRPr>
+          </a:p>
+          <a:p>
+            <a:pPr indent="0" lvl="0" marL="0">
+              <a:spcBef>
+                <a:spcPts val="0"/>
+              </a:spcBef>
+              <a:spcAft>
+                <a:spcPts val="0"/>
+              </a:spcAft>
+              <a:buNone/>
+            </a:pPr>
+            <a:r>
+              <a:rPr lang="en-US">
+                <a:latin typeface="Calibri"/>
+                <a:ea typeface="Calibri"/>
+                <a:cs typeface="Calibri"/>
+                <a:sym typeface="Calibri"/>
+              </a:rPr>
+              <a:t>Datenverarbeitung mbH Göttingen</a:t>
+            </a:r>
+            <a:endParaRPr>
+              <a:latin typeface="Calibri"/>
+              <a:ea typeface="Calibri"/>
+              <a:cs typeface="Calibri"/>
+              <a:sym typeface="Calibri"/>
+            </a:endParaRPr>
+          </a:p>
+          <a:p>
+            <a:pPr indent="0" lvl="0" marL="0">
+              <a:spcBef>
+                <a:spcPts val="0"/>
+              </a:spcBef>
+              <a:spcAft>
+                <a:spcPts val="0"/>
+              </a:spcAft>
+              <a:buNone/>
+            </a:pPr>
+            <a:r>
+              <a:rPr lang="en-US">
+                <a:latin typeface="Calibri"/>
+                <a:ea typeface="Calibri"/>
+                <a:cs typeface="Calibri"/>
+                <a:sym typeface="Calibri"/>
+              </a:rPr>
+              <a:t>Web: www.gwdg.de</a:t>
+            </a:r>
+            <a:endParaRPr>
+              <a:latin typeface="Calibri"/>
+              <a:ea typeface="Calibri"/>
+              <a:cs typeface="Calibri"/>
+              <a:sym typeface="Calibri"/>
+            </a:endParaRPr>
+          </a:p>
+          <a:p>
+            <a:pPr indent="0" lvl="0" marL="0">
+              <a:spcBef>
+                <a:spcPts val="0"/>
+              </a:spcBef>
+              <a:spcAft>
+                <a:spcPts val="0"/>
+              </a:spcAft>
+              <a:buClr>
+                <a:schemeClr val="dk1"/>
+              </a:buClr>
+              <a:buSzPts val="1100"/>
+              <a:buFont typeface="Arial"/>
+              <a:buNone/>
+            </a:pPr>
+            <a:r>
+              <a:t/>
+            </a:r>
+            <a:endParaRPr sz="1000">
               <a:solidFill>
-                <a:srgbClr val="42719B"/>
+                <a:srgbClr val="212121"/>
               </a:solidFill>
-              <a:prstDash val="solid"/>
-              <a:miter lim="800000"/>
-              <a:headEnd len="sm" w="sm" type="none"/>
-              <a:tailEnd len="sm" w="sm" type="none"/>
-            </a:ln>
-          </p:spPr>
-          <p:txBody>
-            <a:bodyPr anchorCtr="0" anchor="ctr" bIns="45700" lIns="91425" spcFirstLastPara="1" rIns="91425" wrap="square" tIns="45700">
-              <a:noAutofit/>
-            </a:bodyPr>
-            <a:lstStyle/>
-            <a:p>
-              <a:pPr indent="0" lvl="0" marL="0" marR="0" rtl="0" algn="ctr">
-                <a:spcBef>
-                  <a:spcPts val="0"/>
-                </a:spcBef>
-                <a:spcAft>
-                  <a:spcPts val="0"/>
-                </a:spcAft>
-                <a:buNone/>
-              </a:pPr>
-              <a:r>
-                <a:t/>
-              </a:r>
-              <a:endParaRPr b="0" i="0" sz="1800" u="none" cap="none" strike="noStrike">
-                <a:solidFill>
-                  <a:schemeClr val="lt1"/>
-                </a:solidFill>
-                <a:latin typeface="Calibri"/>
-                <a:ea typeface="Calibri"/>
-                <a:cs typeface="Calibri"/>
-                <a:sym typeface="Calibri"/>
-              </a:endParaRPr>
-            </a:p>
-          </p:txBody>
-        </p:sp>
-        <p:cxnSp>
-          <p:nvCxnSpPr>
-            <p:cNvPr id="265" name="Shape 265"/>
-            <p:cNvCxnSpPr/>
-            <p:nvPr/>
-          </p:nvCxnSpPr>
-          <p:spPr>
-            <a:xfrm flipH="1">
-              <a:off x="6187925" y="4207425"/>
-              <a:ext cx="9900" cy="1557000"/>
-            </a:xfrm>
-            <a:prstGeom prst="straightConnector1">
-              <a:avLst/>
-            </a:prstGeom>
-            <a:noFill/>
-            <a:ln cap="flat" cmpd="sng" w="38100">
-              <a:solidFill>
-                <a:schemeClr val="accent1"/>
-              </a:solidFill>
-              <a:prstDash val="solid"/>
-              <a:miter lim="800000"/>
-              <a:headEnd len="sm" w="sm" type="none"/>
-              <a:tailEnd len="med" w="med" type="triangle"/>
-            </a:ln>
-          </p:spPr>
-        </p:cxnSp>
-        <p:sp>
-          <p:nvSpPr>
-            <p:cNvPr id="266" name="Shape 266"/>
-            <p:cNvSpPr/>
-            <p:nvPr/>
-          </p:nvSpPr>
-          <p:spPr>
-            <a:xfrm>
-              <a:off x="1724167" y="5769238"/>
-              <a:ext cx="7247100" cy="1012500"/>
-            </a:xfrm>
-            <a:prstGeom prst="roundRect">
-              <a:avLst>
-                <a:gd fmla="val 16667" name="adj"/>
-              </a:avLst>
-            </a:prstGeom>
-            <a:noFill/>
-            <a:ln cap="flat" cmpd="sng" w="12700">
-              <a:solidFill>
-                <a:schemeClr val="dk1"/>
-              </a:solidFill>
-              <a:prstDash val="dash"/>
-              <a:miter lim="800000"/>
-              <a:headEnd len="sm" w="sm" type="none"/>
-              <a:tailEnd len="sm" w="sm" type="none"/>
-            </a:ln>
-          </p:spPr>
-          <p:txBody>
-            <a:bodyPr anchorCtr="0" anchor="ctr" bIns="45700" lIns="91425" spcFirstLastPara="1" rIns="91425" wrap="square" tIns="45700">
-              <a:noAutofit/>
-            </a:bodyPr>
-            <a:lstStyle/>
-            <a:p>
-              <a:pPr indent="0" lvl="0" marL="0" marR="0" rtl="0" algn="ctr">
-                <a:spcBef>
-                  <a:spcPts val="0"/>
-                </a:spcBef>
-                <a:spcAft>
-                  <a:spcPts val="0"/>
-                </a:spcAft>
-                <a:buNone/>
-              </a:pPr>
-              <a:r>
-                <a:t/>
-              </a:r>
-              <a:endParaRPr b="0" i="0" sz="1800" u="none" cap="none" strike="noStrike">
-                <a:solidFill>
-                  <a:schemeClr val="lt1"/>
-                </a:solidFill>
-                <a:latin typeface="Calibri"/>
-                <a:ea typeface="Calibri"/>
-                <a:cs typeface="Calibri"/>
-                <a:sym typeface="Calibri"/>
-              </a:endParaRPr>
-            </a:p>
-          </p:txBody>
-        </p:sp>
-        <p:cxnSp>
-          <p:nvCxnSpPr>
-            <p:cNvPr id="267" name="Shape 267"/>
-            <p:cNvCxnSpPr/>
-            <p:nvPr/>
-          </p:nvCxnSpPr>
-          <p:spPr>
-            <a:xfrm rot="10800000">
-              <a:off x="2818050" y="4020051"/>
-              <a:ext cx="1838400" cy="14100"/>
-            </a:xfrm>
-            <a:prstGeom prst="straightConnector1">
-              <a:avLst/>
-            </a:prstGeom>
-            <a:noFill/>
-            <a:ln cap="flat" cmpd="sng" w="57150">
-              <a:solidFill>
-                <a:schemeClr val="accent1"/>
-              </a:solidFill>
-              <a:prstDash val="solid"/>
-              <a:miter lim="800000"/>
-              <a:headEnd len="sm" w="sm" type="none"/>
-              <a:tailEnd len="sm" w="sm" type="none"/>
-            </a:ln>
-          </p:spPr>
-        </p:cxnSp>
-        <p:cxnSp>
-          <p:nvCxnSpPr>
-            <p:cNvPr id="268" name="Shape 268"/>
-            <p:cNvCxnSpPr/>
-            <p:nvPr/>
-          </p:nvCxnSpPr>
-          <p:spPr>
-            <a:xfrm rot="10800000">
-              <a:off x="5857450" y="4048225"/>
-              <a:ext cx="1966200" cy="11400"/>
-            </a:xfrm>
-            <a:prstGeom prst="straightConnector1">
-              <a:avLst/>
-            </a:prstGeom>
-            <a:noFill/>
-            <a:ln cap="flat" cmpd="sng" w="57150">
-              <a:solidFill>
-                <a:schemeClr val="accent1"/>
-              </a:solidFill>
-              <a:prstDash val="solid"/>
-              <a:miter lim="800000"/>
-              <a:headEnd len="sm" w="sm" type="none"/>
-              <a:tailEnd len="sm" w="sm" type="none"/>
-            </a:ln>
-          </p:spPr>
-        </p:cxnSp>
-        <p:cxnSp>
-          <p:nvCxnSpPr>
-            <p:cNvPr id="269" name="Shape 269"/>
-            <p:cNvCxnSpPr/>
-            <p:nvPr/>
-          </p:nvCxnSpPr>
-          <p:spPr>
-            <a:xfrm>
-              <a:off x="7809850" y="4067500"/>
-              <a:ext cx="3900" cy="1686900"/>
-            </a:xfrm>
-            <a:prstGeom prst="straightConnector1">
-              <a:avLst/>
-            </a:prstGeom>
-            <a:noFill/>
-            <a:ln cap="flat" cmpd="sng" w="38100">
-              <a:solidFill>
-                <a:schemeClr val="accent1"/>
-              </a:solidFill>
-              <a:prstDash val="solid"/>
-              <a:miter lim="800000"/>
-              <a:headEnd len="sm" w="sm" type="none"/>
-              <a:tailEnd len="med" w="med" type="triangle"/>
-            </a:ln>
-          </p:spPr>
-        </p:cxnSp>
-        <p:sp>
-          <p:nvSpPr>
-            <p:cNvPr id="270" name="Shape 270"/>
-            <p:cNvSpPr/>
-            <p:nvPr/>
-          </p:nvSpPr>
-          <p:spPr>
-            <a:xfrm>
-              <a:off x="2967378" y="403266"/>
-              <a:ext cx="862512" cy="562708"/>
-            </a:xfrm>
-            <a:prstGeom prst="flowChartMagneticDisk">
-              <a:avLst/>
-            </a:prstGeom>
-            <a:solidFill>
-              <a:schemeClr val="accent3"/>
-            </a:solidFill>
-            <a:ln cap="flat" cmpd="sng" w="12700">
-              <a:solidFill>
-                <a:srgbClr val="42719B"/>
-              </a:solidFill>
-              <a:prstDash val="solid"/>
-              <a:miter lim="800000"/>
-              <a:headEnd len="sm" w="sm" type="none"/>
-              <a:tailEnd len="sm" w="sm" type="none"/>
-            </a:ln>
-          </p:spPr>
-          <p:txBody>
-            <a:bodyPr anchorCtr="0" anchor="ctr" bIns="45700" lIns="91425" spcFirstLastPara="1" rIns="91425" wrap="square" tIns="45700">
-              <a:noAutofit/>
-            </a:bodyPr>
-            <a:lstStyle/>
-            <a:p>
-              <a:pPr indent="0" lvl="0" marL="0" marR="0" rtl="0" algn="ctr">
-                <a:spcBef>
-                  <a:spcPts val="0"/>
-                </a:spcBef>
-                <a:spcAft>
-                  <a:spcPts val="0"/>
-                </a:spcAft>
-                <a:buNone/>
-              </a:pPr>
-              <a:r>
-                <a:t/>
-              </a:r>
-              <a:endParaRPr b="0" i="0" sz="1800" u="none" cap="none" strike="noStrike">
-                <a:solidFill>
-                  <a:schemeClr val="lt1"/>
-                </a:solidFill>
-                <a:latin typeface="Calibri"/>
-                <a:ea typeface="Calibri"/>
-                <a:cs typeface="Calibri"/>
-                <a:sym typeface="Calibri"/>
-              </a:endParaRPr>
-            </a:p>
-          </p:txBody>
-        </p:sp>
-        <p:sp>
-          <p:nvSpPr>
-            <p:cNvPr id="271" name="Shape 271"/>
-            <p:cNvSpPr/>
-            <p:nvPr/>
-          </p:nvSpPr>
-          <p:spPr>
-            <a:xfrm>
-              <a:off x="4247228" y="403266"/>
-              <a:ext cx="862512" cy="562708"/>
-            </a:xfrm>
-            <a:prstGeom prst="flowChartMagneticDisk">
-              <a:avLst/>
-            </a:prstGeom>
-            <a:solidFill>
-              <a:schemeClr val="accent3"/>
-            </a:solidFill>
-            <a:ln cap="flat" cmpd="sng" w="12700">
-              <a:solidFill>
-                <a:srgbClr val="42719B"/>
-              </a:solidFill>
-              <a:prstDash val="solid"/>
-              <a:miter lim="800000"/>
-              <a:headEnd len="sm" w="sm" type="none"/>
-              <a:tailEnd len="sm" w="sm" type="none"/>
-            </a:ln>
-          </p:spPr>
-          <p:txBody>
-            <a:bodyPr anchorCtr="0" anchor="ctr" bIns="45700" lIns="91425" spcFirstLastPara="1" rIns="91425" wrap="square" tIns="45700">
-              <a:noAutofit/>
-            </a:bodyPr>
-            <a:lstStyle/>
-            <a:p>
-              <a:pPr indent="0" lvl="0" marL="0" marR="0" rtl="0" algn="ctr">
-                <a:spcBef>
-                  <a:spcPts val="0"/>
-                </a:spcBef>
-                <a:spcAft>
-                  <a:spcPts val="0"/>
-                </a:spcAft>
-                <a:buNone/>
-              </a:pPr>
-              <a:r>
-                <a:t/>
-              </a:r>
-              <a:endParaRPr b="0" i="0" sz="1800" u="none" cap="none" strike="noStrike">
-                <a:solidFill>
-                  <a:schemeClr val="lt1"/>
-                </a:solidFill>
-                <a:latin typeface="Calibri"/>
-                <a:ea typeface="Calibri"/>
-                <a:cs typeface="Calibri"/>
-                <a:sym typeface="Calibri"/>
-              </a:endParaRPr>
-            </a:p>
-          </p:txBody>
-        </p:sp>
-        <p:sp>
-          <p:nvSpPr>
-            <p:cNvPr id="272" name="Shape 272"/>
-            <p:cNvSpPr/>
-            <p:nvPr/>
-          </p:nvSpPr>
-          <p:spPr>
-            <a:xfrm>
-              <a:off x="5509821" y="403266"/>
-              <a:ext cx="862512" cy="562708"/>
-            </a:xfrm>
-            <a:prstGeom prst="flowChartMagneticDisk">
-              <a:avLst/>
-            </a:prstGeom>
-            <a:solidFill>
-              <a:schemeClr val="accent3"/>
-            </a:solidFill>
-            <a:ln cap="flat" cmpd="sng" w="12700">
-              <a:solidFill>
-                <a:srgbClr val="42719B"/>
-              </a:solidFill>
-              <a:prstDash val="solid"/>
-              <a:miter lim="800000"/>
-              <a:headEnd len="sm" w="sm" type="none"/>
-              <a:tailEnd len="sm" w="sm" type="none"/>
-            </a:ln>
-          </p:spPr>
-          <p:txBody>
-            <a:bodyPr anchorCtr="0" anchor="ctr" bIns="45700" lIns="91425" spcFirstLastPara="1" rIns="91425" wrap="square" tIns="45700">
-              <a:noAutofit/>
-            </a:bodyPr>
-            <a:lstStyle/>
-            <a:p>
-              <a:pPr indent="0" lvl="0" marL="0" marR="0" rtl="0" algn="ctr">
-                <a:spcBef>
-                  <a:spcPts val="0"/>
-                </a:spcBef>
-                <a:spcAft>
-                  <a:spcPts val="0"/>
-                </a:spcAft>
-                <a:buNone/>
-              </a:pPr>
-              <a:r>
-                <a:t/>
-              </a:r>
-              <a:endParaRPr b="0" i="0" sz="1800" u="none" cap="none" strike="noStrike">
-                <a:solidFill>
-                  <a:schemeClr val="lt1"/>
-                </a:solidFill>
-                <a:latin typeface="Calibri"/>
-                <a:ea typeface="Calibri"/>
-                <a:cs typeface="Calibri"/>
-                <a:sym typeface="Calibri"/>
-              </a:endParaRPr>
-            </a:p>
-          </p:txBody>
-        </p:sp>
-        <p:sp>
-          <p:nvSpPr>
-            <p:cNvPr id="273" name="Shape 273"/>
-            <p:cNvSpPr/>
-            <p:nvPr/>
-          </p:nvSpPr>
-          <p:spPr>
-            <a:xfrm>
-              <a:off x="6772414" y="403266"/>
-              <a:ext cx="862512" cy="562708"/>
-            </a:xfrm>
-            <a:prstGeom prst="flowChartMagneticDisk">
-              <a:avLst/>
-            </a:prstGeom>
-            <a:solidFill>
-              <a:schemeClr val="accent3"/>
-            </a:solidFill>
-            <a:ln cap="flat" cmpd="sng" w="12700">
-              <a:solidFill>
-                <a:srgbClr val="42719B"/>
-              </a:solidFill>
-              <a:prstDash val="solid"/>
-              <a:miter lim="800000"/>
-              <a:headEnd len="sm" w="sm" type="none"/>
-              <a:tailEnd len="sm" w="sm" type="none"/>
-            </a:ln>
-          </p:spPr>
-          <p:txBody>
-            <a:bodyPr anchorCtr="0" anchor="ctr" bIns="45700" lIns="91425" spcFirstLastPara="1" rIns="91425" wrap="square" tIns="45700">
-              <a:noAutofit/>
-            </a:bodyPr>
-            <a:lstStyle/>
-            <a:p>
-              <a:pPr indent="0" lvl="0" marL="0" marR="0" rtl="0" algn="ctr">
-                <a:spcBef>
-                  <a:spcPts val="0"/>
-                </a:spcBef>
-                <a:spcAft>
-                  <a:spcPts val="0"/>
-                </a:spcAft>
-                <a:buNone/>
-              </a:pPr>
-              <a:r>
-                <a:t/>
-              </a:r>
-              <a:endParaRPr b="0" i="0" sz="1800" u="none" cap="none" strike="noStrike">
-                <a:solidFill>
-                  <a:schemeClr val="lt1"/>
-                </a:solidFill>
-                <a:latin typeface="Calibri"/>
-                <a:ea typeface="Calibri"/>
-                <a:cs typeface="Calibri"/>
-                <a:sym typeface="Calibri"/>
-              </a:endParaRPr>
-            </a:p>
-          </p:txBody>
-        </p:sp>
-        <p:pic>
-          <p:nvPicPr>
-            <p:cNvPr id="274" name="Shape 274"/>
-            <p:cNvPicPr preferRelativeResize="0"/>
-            <p:nvPr/>
-          </p:nvPicPr>
-          <p:blipFill rotWithShape="1">
-            <a:blip r:embed="rId4">
-              <a:alphaModFix/>
-            </a:blip>
-            <a:srcRect b="0" l="0" r="0" t="0"/>
-            <a:stretch/>
-          </p:blipFill>
-          <p:spPr>
-            <a:xfrm>
-              <a:off x="8713075" y="1062200"/>
-              <a:ext cx="3056600" cy="2852900"/>
-            </a:xfrm>
-            <a:prstGeom prst="rect">
-              <a:avLst/>
-            </a:prstGeom>
-            <a:noFill/>
-            <a:ln>
-              <a:noFill/>
-            </a:ln>
-          </p:spPr>
-        </p:pic>
-        <p:sp>
-          <p:nvSpPr>
-            <p:cNvPr id="275" name="Shape 275"/>
-            <p:cNvSpPr/>
-            <p:nvPr/>
-          </p:nvSpPr>
-          <p:spPr>
-            <a:xfrm>
-              <a:off x="8565275" y="949350"/>
-              <a:ext cx="3292200" cy="3161100"/>
-            </a:xfrm>
-            <a:prstGeom prst="roundRect">
-              <a:avLst>
-                <a:gd fmla="val 16667" name="adj"/>
-              </a:avLst>
-            </a:prstGeom>
-            <a:noFill/>
-            <a:ln cap="flat" cmpd="sng" w="12700">
-              <a:solidFill>
-                <a:srgbClr val="42719B"/>
-              </a:solidFill>
-              <a:prstDash val="solid"/>
-              <a:miter lim="800000"/>
-              <a:headEnd len="sm" w="sm" type="none"/>
-              <a:tailEnd len="sm" w="sm" type="none"/>
-            </a:ln>
-          </p:spPr>
-          <p:txBody>
-            <a:bodyPr anchorCtr="0" anchor="ctr" bIns="45700" lIns="91425" spcFirstLastPara="1" rIns="91425" wrap="square" tIns="45700">
-              <a:noAutofit/>
-            </a:bodyPr>
-            <a:lstStyle/>
-            <a:p>
-              <a:pPr indent="0" lvl="0" marL="0" marR="0" rtl="0" algn="ctr">
-                <a:spcBef>
-                  <a:spcPts val="0"/>
-                </a:spcBef>
-                <a:spcAft>
-                  <a:spcPts val="0"/>
-                </a:spcAft>
-                <a:buNone/>
-              </a:pPr>
-              <a:r>
-                <a:t/>
-              </a:r>
-              <a:endParaRPr b="0" i="0" sz="1800" u="none" cap="none" strike="noStrike">
-                <a:solidFill>
-                  <a:schemeClr val="lt1"/>
-                </a:solidFill>
-                <a:latin typeface="Calibri"/>
-                <a:ea typeface="Calibri"/>
-                <a:cs typeface="Calibri"/>
-                <a:sym typeface="Calibri"/>
-              </a:endParaRPr>
-            </a:p>
-          </p:txBody>
-        </p:sp>
-        <p:sp>
-          <p:nvSpPr>
-            <p:cNvPr id="276" name="Shape 276"/>
-            <p:cNvSpPr txBox="1"/>
-            <p:nvPr/>
-          </p:nvSpPr>
-          <p:spPr>
-            <a:xfrm>
-              <a:off x="9441195" y="4128875"/>
-              <a:ext cx="1565100" cy="276900"/>
-            </a:xfrm>
-            <a:prstGeom prst="rect">
-              <a:avLst/>
-            </a:prstGeom>
-            <a:noFill/>
-            <a:ln>
-              <a:noFill/>
-            </a:ln>
-          </p:spPr>
-          <p:txBody>
-            <a:bodyPr anchorCtr="0" anchor="t" bIns="45700" lIns="91425" spcFirstLastPara="1" rIns="91425" wrap="square" tIns="45700">
-              <a:noAutofit/>
-            </a:bodyPr>
-            <a:lstStyle/>
-            <a:p>
-              <a:pPr indent="0" lvl="0" marL="0" marR="0" rtl="0" algn="l">
-                <a:spcBef>
-                  <a:spcPts val="0"/>
-                </a:spcBef>
-                <a:spcAft>
-                  <a:spcPts val="0"/>
-                </a:spcAft>
-                <a:buNone/>
-              </a:pPr>
-              <a:r>
-                <a:rPr b="1" i="0" lang="en-US" sz="1200" u="none" cap="none" strike="noStrike">
-                  <a:solidFill>
-                    <a:schemeClr val="dk1"/>
-                  </a:solidFill>
-                  <a:latin typeface="Calibri"/>
-                  <a:ea typeface="Calibri"/>
-                  <a:cs typeface="Calibri"/>
-                  <a:sym typeface="Calibri"/>
-                </a:rPr>
-                <a:t>ArCare Dashboard</a:t>
-              </a:r>
-              <a:endParaRPr b="1" sz="1200">
-                <a:solidFill>
-                  <a:schemeClr val="dk1"/>
-                </a:solidFill>
-                <a:latin typeface="Calibri"/>
-                <a:ea typeface="Calibri"/>
-                <a:cs typeface="Calibri"/>
-                <a:sym typeface="Calibri"/>
-              </a:endParaRPr>
-            </a:p>
-          </p:txBody>
-        </p:sp>
-        <p:sp>
-          <p:nvSpPr>
-            <p:cNvPr id="277" name="Shape 277"/>
-            <p:cNvSpPr txBox="1"/>
-            <p:nvPr/>
-          </p:nvSpPr>
-          <p:spPr>
-            <a:xfrm>
-              <a:off x="4630138" y="1404025"/>
-              <a:ext cx="2021100" cy="450900"/>
-            </a:xfrm>
-            <a:prstGeom prst="rect">
-              <a:avLst/>
-            </a:prstGeom>
-            <a:noFill/>
-            <a:ln>
-              <a:noFill/>
-            </a:ln>
-          </p:spPr>
-          <p:txBody>
-            <a:bodyPr anchorCtr="0" anchor="t" bIns="45700" lIns="91425" spcFirstLastPara="1" rIns="91425" wrap="square" tIns="45700">
-              <a:noAutofit/>
-            </a:bodyPr>
-            <a:lstStyle/>
-            <a:p>
-              <a:pPr indent="0" lvl="0" marL="0" marR="0" rtl="0" algn="l">
-                <a:spcBef>
-                  <a:spcPts val="0"/>
-                </a:spcBef>
-                <a:spcAft>
-                  <a:spcPts val="0"/>
-                </a:spcAft>
-                <a:buNone/>
-              </a:pPr>
-              <a:r>
-                <a:rPr lang="en-US">
-                  <a:latin typeface="Calibri"/>
-                  <a:ea typeface="Calibri"/>
-                  <a:cs typeface="Calibri"/>
-                  <a:sym typeface="Calibri"/>
-                </a:rPr>
-                <a:t>ArCare  Controller</a:t>
-              </a:r>
-              <a:endParaRPr>
-                <a:latin typeface="Calibri"/>
-                <a:ea typeface="Calibri"/>
-                <a:cs typeface="Calibri"/>
-                <a:sym typeface="Calibri"/>
-              </a:endParaRPr>
-            </a:p>
-          </p:txBody>
-        </p:sp>
-        <p:sp>
-          <p:nvSpPr>
-            <p:cNvPr id="278" name="Shape 278"/>
-            <p:cNvSpPr txBox="1"/>
-            <p:nvPr/>
-          </p:nvSpPr>
-          <p:spPr>
-            <a:xfrm>
-              <a:off x="3004359" y="565565"/>
-              <a:ext cx="867900" cy="369300"/>
-            </a:xfrm>
-            <a:prstGeom prst="rect">
-              <a:avLst/>
-            </a:prstGeom>
-            <a:noFill/>
-            <a:ln>
-              <a:noFill/>
-            </a:ln>
-          </p:spPr>
-          <p:txBody>
-            <a:bodyPr anchorCtr="0" anchor="t" bIns="45700" lIns="91425" spcFirstLastPara="1" rIns="91425" wrap="square" tIns="45700">
-              <a:noAutofit/>
-            </a:bodyPr>
-            <a:lstStyle/>
-            <a:p>
-              <a:pPr indent="0" lvl="0" marL="0" marR="0" rtl="0" algn="l">
-                <a:spcBef>
-                  <a:spcPts val="0"/>
-                </a:spcBef>
-                <a:spcAft>
-                  <a:spcPts val="0"/>
-                </a:spcAft>
-                <a:buNone/>
-              </a:pPr>
-              <a:r>
-                <a:rPr lang="en-US" sz="1800">
-                  <a:solidFill>
-                    <a:schemeClr val="lt1"/>
-                  </a:solidFill>
-                  <a:latin typeface="Calibri"/>
-                  <a:ea typeface="Calibri"/>
-                  <a:cs typeface="Calibri"/>
-                  <a:sym typeface="Calibri"/>
-                </a:rPr>
-                <a:t>App:1</a:t>
-              </a:r>
-              <a:endParaRPr sz="1800">
-                <a:solidFill>
-                  <a:schemeClr val="lt1"/>
-                </a:solidFill>
-                <a:latin typeface="Calibri"/>
-                <a:ea typeface="Calibri"/>
-                <a:cs typeface="Calibri"/>
-                <a:sym typeface="Calibri"/>
-              </a:endParaRPr>
-            </a:p>
-          </p:txBody>
-        </p:sp>
-        <p:sp>
-          <p:nvSpPr>
-            <p:cNvPr id="279" name="Shape 279"/>
-            <p:cNvSpPr txBox="1"/>
-            <p:nvPr/>
-          </p:nvSpPr>
-          <p:spPr>
-            <a:xfrm>
-              <a:off x="4282173" y="577288"/>
-              <a:ext cx="867900" cy="369300"/>
-            </a:xfrm>
-            <a:prstGeom prst="rect">
-              <a:avLst/>
-            </a:prstGeom>
-            <a:noFill/>
-            <a:ln>
-              <a:noFill/>
-            </a:ln>
-          </p:spPr>
-          <p:txBody>
-            <a:bodyPr anchorCtr="0" anchor="t" bIns="45700" lIns="91425" spcFirstLastPara="1" rIns="91425" wrap="square" tIns="45700">
-              <a:noAutofit/>
-            </a:bodyPr>
-            <a:lstStyle/>
-            <a:p>
-              <a:pPr indent="0" lvl="0" marL="0" marR="0" rtl="0" algn="l">
-                <a:spcBef>
-                  <a:spcPts val="0"/>
-                </a:spcBef>
-                <a:spcAft>
-                  <a:spcPts val="0"/>
-                </a:spcAft>
-                <a:buNone/>
-              </a:pPr>
-              <a:r>
-                <a:rPr lang="en-US" sz="1800">
-                  <a:solidFill>
-                    <a:schemeClr val="lt1"/>
-                  </a:solidFill>
-                  <a:latin typeface="Calibri"/>
-                  <a:ea typeface="Calibri"/>
-                  <a:cs typeface="Calibri"/>
-                  <a:sym typeface="Calibri"/>
-                </a:rPr>
-                <a:t>App:2</a:t>
-              </a:r>
-              <a:endParaRPr sz="1800">
-                <a:solidFill>
-                  <a:schemeClr val="lt1"/>
-                </a:solidFill>
-                <a:latin typeface="Calibri"/>
-                <a:ea typeface="Calibri"/>
-                <a:cs typeface="Calibri"/>
-                <a:sym typeface="Calibri"/>
-              </a:endParaRPr>
-            </a:p>
-          </p:txBody>
-        </p:sp>
-        <p:sp>
-          <p:nvSpPr>
-            <p:cNvPr id="280" name="Shape 280"/>
-            <p:cNvSpPr txBox="1"/>
-            <p:nvPr/>
-          </p:nvSpPr>
-          <p:spPr>
-            <a:xfrm>
-              <a:off x="5590469" y="563217"/>
-              <a:ext cx="867900" cy="369300"/>
-            </a:xfrm>
-            <a:prstGeom prst="rect">
-              <a:avLst/>
-            </a:prstGeom>
-            <a:noFill/>
-            <a:ln>
-              <a:noFill/>
-            </a:ln>
-          </p:spPr>
-          <p:txBody>
-            <a:bodyPr anchorCtr="0" anchor="t" bIns="45700" lIns="91425" spcFirstLastPara="1" rIns="91425" wrap="square" tIns="45700">
-              <a:noAutofit/>
-            </a:bodyPr>
-            <a:lstStyle/>
-            <a:p>
-              <a:pPr indent="0" lvl="0" marL="0" marR="0" rtl="0" algn="l">
-                <a:spcBef>
-                  <a:spcPts val="0"/>
-                </a:spcBef>
-                <a:spcAft>
-                  <a:spcPts val="0"/>
-                </a:spcAft>
-                <a:buNone/>
-              </a:pPr>
-              <a:r>
-                <a:rPr lang="en-US" sz="1800">
-                  <a:solidFill>
-                    <a:schemeClr val="lt1"/>
-                  </a:solidFill>
-                  <a:latin typeface="Calibri"/>
-                  <a:ea typeface="Calibri"/>
-                  <a:cs typeface="Calibri"/>
-                  <a:sym typeface="Calibri"/>
-                </a:rPr>
-                <a:t>App:3</a:t>
-              </a:r>
-              <a:endParaRPr sz="1800">
-                <a:solidFill>
-                  <a:schemeClr val="lt1"/>
-                </a:solidFill>
-                <a:latin typeface="Calibri"/>
-                <a:ea typeface="Calibri"/>
-                <a:cs typeface="Calibri"/>
-                <a:sym typeface="Calibri"/>
-              </a:endParaRPr>
-            </a:p>
-          </p:txBody>
-        </p:sp>
-        <p:sp>
-          <p:nvSpPr>
-            <p:cNvPr id="281" name="Shape 281"/>
-            <p:cNvSpPr txBox="1"/>
-            <p:nvPr/>
-          </p:nvSpPr>
-          <p:spPr>
-            <a:xfrm>
-              <a:off x="6842494" y="563222"/>
-              <a:ext cx="867900" cy="369300"/>
-            </a:xfrm>
-            <a:prstGeom prst="rect">
-              <a:avLst/>
-            </a:prstGeom>
-            <a:noFill/>
-            <a:ln>
-              <a:noFill/>
-            </a:ln>
-          </p:spPr>
-          <p:txBody>
-            <a:bodyPr anchorCtr="0" anchor="t" bIns="45700" lIns="91425" spcFirstLastPara="1" rIns="91425" wrap="square" tIns="45700">
-              <a:noAutofit/>
-            </a:bodyPr>
-            <a:lstStyle/>
-            <a:p>
-              <a:pPr indent="0" lvl="0" marL="0" marR="0" rtl="0" algn="l">
-                <a:spcBef>
-                  <a:spcPts val="0"/>
-                </a:spcBef>
-                <a:spcAft>
-                  <a:spcPts val="0"/>
-                </a:spcAft>
-                <a:buNone/>
-              </a:pPr>
-              <a:r>
-                <a:rPr lang="en-US" sz="1800">
-                  <a:solidFill>
-                    <a:schemeClr val="lt1"/>
-                  </a:solidFill>
-                  <a:latin typeface="Calibri"/>
-                  <a:ea typeface="Calibri"/>
-                  <a:cs typeface="Calibri"/>
-                  <a:sym typeface="Calibri"/>
-                </a:rPr>
-                <a:t>App:4</a:t>
-              </a:r>
-              <a:endParaRPr sz="1800">
-                <a:solidFill>
-                  <a:schemeClr val="lt1"/>
-                </a:solidFill>
-                <a:latin typeface="Calibri"/>
-                <a:ea typeface="Calibri"/>
-                <a:cs typeface="Calibri"/>
-                <a:sym typeface="Calibri"/>
-              </a:endParaRPr>
-            </a:p>
-          </p:txBody>
-        </p:sp>
-        <p:sp>
-          <p:nvSpPr>
-            <p:cNvPr id="282" name="Shape 282"/>
-            <p:cNvSpPr/>
-            <p:nvPr/>
-          </p:nvSpPr>
-          <p:spPr>
-            <a:xfrm>
-              <a:off x="2719650" y="121025"/>
-              <a:ext cx="5183400" cy="906600"/>
-            </a:xfrm>
-            <a:prstGeom prst="roundRect">
-              <a:avLst>
-                <a:gd fmla="val 16667" name="adj"/>
-              </a:avLst>
-            </a:prstGeom>
-            <a:noFill/>
-            <a:ln cap="flat" cmpd="sng" w="12700">
-              <a:solidFill>
-                <a:schemeClr val="dk1"/>
-              </a:solidFill>
-              <a:prstDash val="dash"/>
-              <a:miter lim="800000"/>
-              <a:headEnd len="sm" w="sm" type="none"/>
-              <a:tailEnd len="sm" w="sm" type="none"/>
-            </a:ln>
-          </p:spPr>
-          <p:txBody>
-            <a:bodyPr anchorCtr="0" anchor="ctr" bIns="45700" lIns="91425" spcFirstLastPara="1" rIns="91425" wrap="square" tIns="45700">
-              <a:noAutofit/>
-            </a:bodyPr>
-            <a:lstStyle/>
-            <a:p>
-              <a:pPr indent="0" lvl="0" marL="0" marR="0" rtl="0" algn="ctr">
-                <a:spcBef>
-                  <a:spcPts val="0"/>
-                </a:spcBef>
-                <a:spcAft>
-                  <a:spcPts val="0"/>
-                </a:spcAft>
-                <a:buNone/>
-              </a:pPr>
-              <a:r>
-                <a:t/>
-              </a:r>
-              <a:endParaRPr sz="1800">
-                <a:solidFill>
-                  <a:schemeClr val="lt1"/>
-                </a:solidFill>
-                <a:latin typeface="Calibri"/>
-                <a:ea typeface="Calibri"/>
-                <a:cs typeface="Calibri"/>
-                <a:sym typeface="Calibri"/>
-              </a:endParaRPr>
-            </a:p>
-          </p:txBody>
-        </p:sp>
-        <p:sp>
-          <p:nvSpPr>
-            <p:cNvPr id="283" name="Shape 283"/>
-            <p:cNvSpPr txBox="1"/>
-            <p:nvPr/>
-          </p:nvSpPr>
-          <p:spPr>
-            <a:xfrm>
-              <a:off x="6372114" y="1830312"/>
-              <a:ext cx="599100" cy="246300"/>
-            </a:xfrm>
-            <a:prstGeom prst="rect">
-              <a:avLst/>
-            </a:prstGeom>
-            <a:noFill/>
-            <a:ln>
-              <a:noFill/>
-            </a:ln>
-          </p:spPr>
-          <p:txBody>
-            <a:bodyPr anchorCtr="0" anchor="t" bIns="45700" lIns="91425" spcFirstLastPara="1" rIns="91425" wrap="square" tIns="45700">
-              <a:noAutofit/>
-            </a:bodyPr>
-            <a:lstStyle/>
-            <a:p>
-              <a:pPr indent="0" lvl="0" marL="0" marR="0" rtl="0" algn="l">
-                <a:spcBef>
-                  <a:spcPts val="0"/>
-                </a:spcBef>
-                <a:spcAft>
-                  <a:spcPts val="0"/>
-                </a:spcAft>
-                <a:buNone/>
-              </a:pPr>
-              <a:r>
-                <a:rPr b="1" lang="en-US" sz="1000">
-                  <a:solidFill>
-                    <a:schemeClr val="dk1"/>
-                  </a:solidFill>
-                  <a:latin typeface="Calibri"/>
-                  <a:ea typeface="Calibri"/>
-                  <a:cs typeface="Calibri"/>
-                  <a:sym typeface="Calibri"/>
-                </a:rPr>
-                <a:t>Policies</a:t>
-              </a:r>
-              <a:endParaRPr b="1" sz="1000">
-                <a:solidFill>
-                  <a:schemeClr val="dk1"/>
-                </a:solidFill>
-                <a:latin typeface="Calibri"/>
-                <a:ea typeface="Calibri"/>
-                <a:cs typeface="Calibri"/>
-                <a:sym typeface="Calibri"/>
-              </a:endParaRPr>
-            </a:p>
-          </p:txBody>
-        </p:sp>
-        <p:sp>
-          <p:nvSpPr>
-            <p:cNvPr id="284" name="Shape 284"/>
-            <p:cNvSpPr txBox="1"/>
-            <p:nvPr/>
-          </p:nvSpPr>
-          <p:spPr>
-            <a:xfrm>
-              <a:off x="6940687" y="1817968"/>
-              <a:ext cx="515100" cy="246300"/>
-            </a:xfrm>
-            <a:prstGeom prst="rect">
-              <a:avLst/>
-            </a:prstGeom>
-            <a:noFill/>
-            <a:ln>
-              <a:noFill/>
-            </a:ln>
-          </p:spPr>
-          <p:txBody>
-            <a:bodyPr anchorCtr="0" anchor="t" bIns="45700" lIns="91425" spcFirstLastPara="1" rIns="91425" wrap="square" tIns="45700">
-              <a:noAutofit/>
-            </a:bodyPr>
-            <a:lstStyle/>
-            <a:p>
-              <a:pPr indent="0" lvl="0" marL="0" marR="0" rtl="0" algn="l">
-                <a:spcBef>
-                  <a:spcPts val="0"/>
-                </a:spcBef>
-                <a:spcAft>
-                  <a:spcPts val="0"/>
-                </a:spcAft>
-                <a:buNone/>
-              </a:pPr>
-              <a:r>
-                <a:rPr b="1" lang="en-US" sz="1000">
-                  <a:solidFill>
-                    <a:schemeClr val="dk1"/>
-                  </a:solidFill>
-                  <a:latin typeface="Calibri"/>
-                  <a:ea typeface="Calibri"/>
-                  <a:cs typeface="Calibri"/>
-                  <a:sym typeface="Calibri"/>
-                </a:rPr>
-                <a:t>Rules</a:t>
-              </a:r>
-              <a:endParaRPr b="1" sz="1000">
-                <a:solidFill>
-                  <a:schemeClr val="dk1"/>
-                </a:solidFill>
-                <a:latin typeface="Calibri"/>
-                <a:ea typeface="Calibri"/>
-                <a:cs typeface="Calibri"/>
-                <a:sym typeface="Calibri"/>
-              </a:endParaRPr>
-            </a:p>
-          </p:txBody>
-        </p:sp>
-        <p:sp>
-          <p:nvSpPr>
-            <p:cNvPr id="285" name="Shape 285"/>
-            <p:cNvSpPr txBox="1"/>
-            <p:nvPr/>
-          </p:nvSpPr>
-          <p:spPr>
-            <a:xfrm>
-              <a:off x="7475261" y="1813896"/>
-              <a:ext cx="746700" cy="246300"/>
-            </a:xfrm>
-            <a:prstGeom prst="rect">
-              <a:avLst/>
-            </a:prstGeom>
-            <a:noFill/>
-            <a:ln>
-              <a:noFill/>
-            </a:ln>
-          </p:spPr>
-          <p:txBody>
-            <a:bodyPr anchorCtr="0" anchor="t" bIns="45700" lIns="91425" spcFirstLastPara="1" rIns="91425" wrap="square" tIns="45700">
-              <a:noAutofit/>
-            </a:bodyPr>
-            <a:lstStyle/>
-            <a:p>
-              <a:pPr indent="0" lvl="0" marL="0" marR="0" rtl="0" algn="l">
-                <a:spcBef>
-                  <a:spcPts val="0"/>
-                </a:spcBef>
-                <a:spcAft>
-                  <a:spcPts val="0"/>
-                </a:spcAft>
-                <a:buNone/>
-              </a:pPr>
-              <a:r>
-                <a:rPr b="1" lang="en-US" sz="1000">
-                  <a:solidFill>
-                    <a:schemeClr val="dk1"/>
-                  </a:solidFill>
-                  <a:latin typeface="Calibri"/>
-                  <a:ea typeface="Calibri"/>
-                  <a:cs typeface="Calibri"/>
-                  <a:sym typeface="Calibri"/>
-                </a:rPr>
-                <a:t>Datastore</a:t>
-              </a:r>
-              <a:endParaRPr b="1" sz="1000">
-                <a:solidFill>
-                  <a:schemeClr val="dk1"/>
-                </a:solidFill>
-                <a:latin typeface="Calibri"/>
-                <a:ea typeface="Calibri"/>
-                <a:cs typeface="Calibri"/>
-                <a:sym typeface="Calibri"/>
-              </a:endParaRPr>
-            </a:p>
-          </p:txBody>
-        </p:sp>
-        <p:sp>
-          <p:nvSpPr>
-            <p:cNvPr id="286" name="Shape 286"/>
-            <p:cNvSpPr txBox="1"/>
-            <p:nvPr/>
-          </p:nvSpPr>
-          <p:spPr>
-            <a:xfrm>
-              <a:off x="4524650" y="125227"/>
-              <a:ext cx="2587800" cy="276900"/>
-            </a:xfrm>
-            <a:prstGeom prst="rect">
-              <a:avLst/>
-            </a:prstGeom>
-            <a:noFill/>
-            <a:ln>
-              <a:noFill/>
-            </a:ln>
-          </p:spPr>
-          <p:txBody>
-            <a:bodyPr anchorCtr="0" anchor="t" bIns="45700" lIns="91425" spcFirstLastPara="1" rIns="91425" wrap="square" tIns="45700">
-              <a:noAutofit/>
-            </a:bodyPr>
-            <a:lstStyle/>
-            <a:p>
-              <a:pPr indent="0" lvl="0" marL="0" rtl="0">
-                <a:spcBef>
-                  <a:spcPts val="0"/>
-                </a:spcBef>
-                <a:spcAft>
-                  <a:spcPts val="0"/>
-                </a:spcAft>
-                <a:buNone/>
-              </a:pPr>
-              <a:r>
-                <a:rPr lang="en-US"/>
-                <a:t>Application Engine</a:t>
-              </a:r>
-              <a:endParaRPr/>
-            </a:p>
-          </p:txBody>
-        </p:sp>
-        <p:sp>
-          <p:nvSpPr>
-            <p:cNvPr id="287" name="Shape 287"/>
-            <p:cNvSpPr txBox="1"/>
-            <p:nvPr/>
-          </p:nvSpPr>
-          <p:spPr>
-            <a:xfrm>
-              <a:off x="4341376" y="6455000"/>
-              <a:ext cx="3442800" cy="276900"/>
-            </a:xfrm>
-            <a:prstGeom prst="rect">
-              <a:avLst/>
-            </a:prstGeom>
-            <a:noFill/>
-            <a:ln>
-              <a:noFill/>
-            </a:ln>
-          </p:spPr>
-          <p:txBody>
-            <a:bodyPr anchorCtr="0" anchor="t" bIns="45700" lIns="91425" spcFirstLastPara="1" rIns="91425" wrap="square" tIns="45700">
-              <a:noAutofit/>
-            </a:bodyPr>
-            <a:lstStyle/>
-            <a:p>
-              <a:pPr indent="0" lvl="0" marL="0" marR="0" rtl="0" algn="l">
-                <a:spcBef>
-                  <a:spcPts val="0"/>
-                </a:spcBef>
-                <a:spcAft>
-                  <a:spcPts val="0"/>
-                </a:spcAft>
-                <a:buNone/>
-              </a:pPr>
-              <a:r>
-                <a:rPr b="1" lang="en-US" sz="1200">
-                  <a:solidFill>
-                    <a:schemeClr val="dk1"/>
-                  </a:solidFill>
-                  <a:latin typeface="Calibri"/>
-                  <a:ea typeface="Calibri"/>
-                  <a:cs typeface="Calibri"/>
-                  <a:sym typeface="Calibri"/>
-                </a:rPr>
-                <a:t>Mass Spectrometry </a:t>
-              </a:r>
-              <a:r>
-                <a:rPr b="1" lang="en-US" sz="1200">
-                  <a:solidFill>
-                    <a:schemeClr val="dk1"/>
-                  </a:solidFill>
-                  <a:latin typeface="Calibri"/>
-                  <a:ea typeface="Calibri"/>
-                  <a:cs typeface="Calibri"/>
-                  <a:sym typeface="Calibri"/>
-                </a:rPr>
-                <a:t>Devices</a:t>
-              </a:r>
-              <a:endParaRPr b="1" sz="1200">
-                <a:solidFill>
-                  <a:schemeClr val="dk1"/>
-                </a:solidFill>
-                <a:latin typeface="Calibri"/>
-                <a:ea typeface="Calibri"/>
-                <a:cs typeface="Calibri"/>
-                <a:sym typeface="Calibri"/>
-              </a:endParaRPr>
-            </a:p>
-          </p:txBody>
-        </p:sp>
-        <p:pic>
-          <p:nvPicPr>
-            <p:cNvPr id="288" name="Shape 288"/>
-            <p:cNvPicPr preferRelativeResize="0"/>
-            <p:nvPr/>
-          </p:nvPicPr>
-          <p:blipFill>
-            <a:blip r:embed="rId5">
-              <a:alphaModFix/>
-            </a:blip>
-            <a:stretch>
-              <a:fillRect/>
-            </a:stretch>
-          </p:blipFill>
-          <p:spPr>
-            <a:xfrm>
-              <a:off x="4029125" y="5855250"/>
-              <a:ext cx="941978" cy="627975"/>
-            </a:xfrm>
-            <a:prstGeom prst="rect">
-              <a:avLst/>
-            </a:prstGeom>
-            <a:noFill/>
-            <a:ln>
-              <a:noFill/>
-            </a:ln>
-          </p:spPr>
-        </p:pic>
-        <p:pic>
-          <p:nvPicPr>
-            <p:cNvPr id="289" name="Shape 289"/>
-            <p:cNvPicPr preferRelativeResize="0"/>
-            <p:nvPr/>
-          </p:nvPicPr>
-          <p:blipFill>
-            <a:blip r:embed="rId6">
-              <a:alphaModFix/>
-            </a:blip>
-            <a:stretch>
-              <a:fillRect/>
-            </a:stretch>
-          </p:blipFill>
-          <p:spPr>
-            <a:xfrm>
-              <a:off x="5772725" y="5847224"/>
-              <a:ext cx="862499" cy="665090"/>
-            </a:xfrm>
-            <a:prstGeom prst="rect">
-              <a:avLst/>
-            </a:prstGeom>
-            <a:noFill/>
-            <a:ln>
-              <a:noFill/>
-            </a:ln>
-          </p:spPr>
-        </p:pic>
-        <p:pic>
-          <p:nvPicPr>
-            <p:cNvPr id="290" name="Shape 290"/>
-            <p:cNvPicPr preferRelativeResize="0"/>
-            <p:nvPr/>
-          </p:nvPicPr>
-          <p:blipFill>
-            <a:blip r:embed="rId7">
-              <a:alphaModFix/>
-            </a:blip>
-            <a:stretch>
-              <a:fillRect/>
-            </a:stretch>
-          </p:blipFill>
-          <p:spPr>
-            <a:xfrm>
-              <a:off x="2065950" y="5779050"/>
-              <a:ext cx="1497725" cy="837700"/>
-            </a:xfrm>
-            <a:prstGeom prst="rect">
-              <a:avLst/>
-            </a:prstGeom>
-            <a:noFill/>
-            <a:ln>
-              <a:noFill/>
-            </a:ln>
-          </p:spPr>
-        </p:pic>
-        <p:pic>
-          <p:nvPicPr>
-            <p:cNvPr id="291" name="Shape 291"/>
-            <p:cNvPicPr preferRelativeResize="0"/>
-            <p:nvPr/>
-          </p:nvPicPr>
-          <p:blipFill>
-            <a:blip r:embed="rId8">
-              <a:alphaModFix/>
-            </a:blip>
-            <a:stretch>
-              <a:fillRect/>
-            </a:stretch>
-          </p:blipFill>
-          <p:spPr>
-            <a:xfrm>
-              <a:off x="7132050" y="5838050"/>
-              <a:ext cx="1064175" cy="906525"/>
-            </a:xfrm>
-            <a:prstGeom prst="rect">
-              <a:avLst/>
-            </a:prstGeom>
-            <a:noFill/>
-            <a:ln>
-              <a:noFill/>
-            </a:ln>
-          </p:spPr>
-        </p:pic>
-        <p:pic>
-          <p:nvPicPr>
-            <p:cNvPr id="292" name="Shape 292"/>
-            <p:cNvPicPr preferRelativeResize="0"/>
-            <p:nvPr/>
-          </p:nvPicPr>
-          <p:blipFill>
-            <a:blip r:embed="rId9">
-              <a:alphaModFix/>
-            </a:blip>
-            <a:stretch>
-              <a:fillRect/>
-            </a:stretch>
-          </p:blipFill>
-          <p:spPr>
-            <a:xfrm>
-              <a:off x="608983" y="3575116"/>
-              <a:ext cx="1150075" cy="622172"/>
-            </a:xfrm>
-            <a:prstGeom prst="rect">
-              <a:avLst/>
-            </a:prstGeom>
-            <a:noFill/>
-            <a:ln>
-              <a:noFill/>
-            </a:ln>
-          </p:spPr>
-        </p:pic>
-        <p:pic>
-          <p:nvPicPr>
-            <p:cNvPr id="293" name="Shape 293"/>
-            <p:cNvPicPr preferRelativeResize="0"/>
-            <p:nvPr/>
-          </p:nvPicPr>
-          <p:blipFill>
-            <a:blip r:embed="rId10">
-              <a:alphaModFix/>
-            </a:blip>
-            <a:stretch>
-              <a:fillRect/>
-            </a:stretch>
-          </p:blipFill>
-          <p:spPr>
-            <a:xfrm>
-              <a:off x="4264725" y="3847913"/>
-              <a:ext cx="2166400" cy="369325"/>
-            </a:xfrm>
-            <a:prstGeom prst="rect">
-              <a:avLst/>
-            </a:prstGeom>
-            <a:noFill/>
-            <a:ln>
-              <a:noFill/>
-            </a:ln>
-          </p:spPr>
-        </p:pic>
-        <p:pic>
-          <p:nvPicPr>
-            <p:cNvPr id="294" name="Shape 294"/>
-            <p:cNvPicPr preferRelativeResize="0"/>
-            <p:nvPr/>
-          </p:nvPicPr>
-          <p:blipFill>
-            <a:blip r:embed="rId11">
-              <a:alphaModFix/>
-            </a:blip>
-            <a:stretch>
-              <a:fillRect/>
-            </a:stretch>
-          </p:blipFill>
-          <p:spPr>
-            <a:xfrm>
-              <a:off x="2910225" y="5212100"/>
-              <a:ext cx="599100" cy="562700"/>
-            </a:xfrm>
-            <a:prstGeom prst="rect">
-              <a:avLst/>
-            </a:prstGeom>
-            <a:noFill/>
-            <a:ln>
-              <a:noFill/>
-            </a:ln>
-          </p:spPr>
-        </p:pic>
-        <p:pic>
-          <p:nvPicPr>
-            <p:cNvPr id="295" name="Shape 295"/>
-            <p:cNvPicPr preferRelativeResize="0"/>
-            <p:nvPr/>
-          </p:nvPicPr>
-          <p:blipFill>
-            <a:blip r:embed="rId12">
-              <a:alphaModFix/>
-            </a:blip>
-            <a:stretch>
-              <a:fillRect/>
-            </a:stretch>
-          </p:blipFill>
-          <p:spPr>
-            <a:xfrm>
-              <a:off x="4998925" y="2800438"/>
-              <a:ext cx="665100" cy="665100"/>
-            </a:xfrm>
-            <a:prstGeom prst="rect">
-              <a:avLst/>
-            </a:prstGeom>
-            <a:noFill/>
-            <a:ln>
-              <a:noFill/>
-            </a:ln>
-          </p:spPr>
-        </p:pic>
-        <p:pic>
-          <p:nvPicPr>
-            <p:cNvPr id="296" name="Shape 296"/>
-            <p:cNvPicPr preferRelativeResize="0"/>
-            <p:nvPr/>
-          </p:nvPicPr>
-          <p:blipFill>
-            <a:blip r:embed="rId11">
-              <a:alphaModFix/>
-            </a:blip>
-            <a:stretch>
-              <a:fillRect/>
-            </a:stretch>
-          </p:blipFill>
-          <p:spPr>
-            <a:xfrm>
-              <a:off x="4595175" y="5212100"/>
-              <a:ext cx="599100" cy="562700"/>
-            </a:xfrm>
-            <a:prstGeom prst="rect">
-              <a:avLst/>
-            </a:prstGeom>
-            <a:noFill/>
-            <a:ln>
-              <a:noFill/>
-            </a:ln>
-          </p:spPr>
-        </p:pic>
-        <p:pic>
-          <p:nvPicPr>
-            <p:cNvPr id="297" name="Shape 297"/>
-            <p:cNvPicPr preferRelativeResize="0"/>
-            <p:nvPr/>
-          </p:nvPicPr>
-          <p:blipFill>
-            <a:blip r:embed="rId11">
-              <a:alphaModFix/>
-            </a:blip>
-            <a:stretch>
-              <a:fillRect/>
-            </a:stretch>
-          </p:blipFill>
-          <p:spPr>
-            <a:xfrm>
-              <a:off x="6241238" y="5212100"/>
-              <a:ext cx="599100" cy="562700"/>
-            </a:xfrm>
-            <a:prstGeom prst="rect">
-              <a:avLst/>
-            </a:prstGeom>
-            <a:noFill/>
-            <a:ln>
-              <a:noFill/>
-            </a:ln>
-          </p:spPr>
-        </p:pic>
-        <p:pic>
-          <p:nvPicPr>
-            <p:cNvPr id="298" name="Shape 298"/>
-            <p:cNvPicPr preferRelativeResize="0"/>
-            <p:nvPr/>
-          </p:nvPicPr>
-          <p:blipFill>
-            <a:blip r:embed="rId11">
-              <a:alphaModFix/>
-            </a:blip>
-            <a:stretch>
-              <a:fillRect/>
-            </a:stretch>
-          </p:blipFill>
-          <p:spPr>
-            <a:xfrm>
-              <a:off x="7826900" y="5189900"/>
-              <a:ext cx="599100" cy="562700"/>
-            </a:xfrm>
-            <a:prstGeom prst="rect">
-              <a:avLst/>
-            </a:prstGeom>
-            <a:noFill/>
-            <a:ln>
-              <a:noFill/>
-            </a:ln>
-          </p:spPr>
-        </p:pic>
-        <p:cxnSp>
-          <p:nvCxnSpPr>
-            <p:cNvPr id="299" name="Shape 299"/>
-            <p:cNvCxnSpPr/>
-            <p:nvPr/>
-          </p:nvCxnSpPr>
-          <p:spPr>
-            <a:xfrm flipH="1">
-              <a:off x="4500114" y="4197450"/>
-              <a:ext cx="22500" cy="1581600"/>
-            </a:xfrm>
-            <a:prstGeom prst="straightConnector1">
-              <a:avLst/>
-            </a:prstGeom>
-            <a:noFill/>
-            <a:ln cap="flat" cmpd="sng" w="38100">
-              <a:solidFill>
-                <a:schemeClr val="accent1"/>
-              </a:solidFill>
-              <a:prstDash val="solid"/>
-              <a:miter lim="800000"/>
-              <a:headEnd len="sm" w="sm" type="none"/>
-              <a:tailEnd len="med" w="med" type="triangle"/>
-            </a:ln>
-          </p:spPr>
-        </p:cxnSp>
-        <p:sp>
-          <p:nvSpPr>
-            <p:cNvPr id="300" name="Shape 300"/>
-            <p:cNvSpPr/>
-            <p:nvPr/>
-          </p:nvSpPr>
-          <p:spPr>
-            <a:xfrm>
-              <a:off x="5266043" y="2475430"/>
-              <a:ext cx="163800" cy="410700"/>
-            </a:xfrm>
-            <a:prstGeom prst="upDownArrow">
-              <a:avLst>
-                <a:gd fmla="val 50000" name="adj1"/>
-                <a:gd fmla="val 50000" name="adj2"/>
-              </a:avLst>
-            </a:prstGeom>
-            <a:solidFill>
-              <a:schemeClr val="accent6"/>
-            </a:solidFill>
-            <a:ln cap="flat" cmpd="sng" w="12700">
-              <a:solidFill>
-                <a:srgbClr val="42719B"/>
-              </a:solidFill>
-              <a:prstDash val="solid"/>
-              <a:miter lim="800000"/>
-              <a:headEnd len="sm" w="sm" type="none"/>
-              <a:tailEnd len="sm" w="sm" type="none"/>
-            </a:ln>
-          </p:spPr>
-          <p:txBody>
-            <a:bodyPr anchorCtr="0" anchor="ctr" bIns="45700" lIns="91425" spcFirstLastPara="1" rIns="91425" wrap="square" tIns="45700">
-              <a:noAutofit/>
-            </a:bodyPr>
-            <a:lstStyle/>
-            <a:p>
-              <a:pPr indent="0" lvl="0" marL="0" marR="0" rtl="0" algn="ctr">
-                <a:spcBef>
-                  <a:spcPts val="0"/>
-                </a:spcBef>
-                <a:spcAft>
-                  <a:spcPts val="0"/>
-                </a:spcAft>
-                <a:buNone/>
-              </a:pPr>
-              <a:r>
-                <a:t/>
-              </a:r>
-              <a:endParaRPr sz="1800">
-                <a:solidFill>
-                  <a:schemeClr val="lt1"/>
-                </a:solidFill>
-                <a:latin typeface="Calibri"/>
-                <a:ea typeface="Calibri"/>
-                <a:cs typeface="Calibri"/>
-                <a:sym typeface="Calibri"/>
-              </a:endParaRPr>
-            </a:p>
-          </p:txBody>
-        </p:sp>
-        <p:sp>
-          <p:nvSpPr>
-            <p:cNvPr id="301" name="Shape 301"/>
-            <p:cNvSpPr/>
-            <p:nvPr/>
-          </p:nvSpPr>
-          <p:spPr>
-            <a:xfrm>
-              <a:off x="5266043" y="3389830"/>
-              <a:ext cx="163800" cy="410700"/>
-            </a:xfrm>
-            <a:prstGeom prst="upDownArrow">
-              <a:avLst>
-                <a:gd fmla="val 50000" name="adj1"/>
-                <a:gd fmla="val 50000" name="adj2"/>
-              </a:avLst>
-            </a:prstGeom>
-            <a:solidFill>
-              <a:schemeClr val="accent6"/>
-            </a:solidFill>
-            <a:ln cap="flat" cmpd="sng" w="12700">
-              <a:solidFill>
-                <a:srgbClr val="42719B"/>
-              </a:solidFill>
-              <a:prstDash val="solid"/>
-              <a:miter lim="800000"/>
-              <a:headEnd len="sm" w="sm" type="none"/>
-              <a:tailEnd len="sm" w="sm" type="none"/>
-            </a:ln>
-          </p:spPr>
-          <p:txBody>
-            <a:bodyPr anchorCtr="0" anchor="ctr" bIns="45700" lIns="91425" spcFirstLastPara="1" rIns="91425" wrap="square" tIns="45700">
-              <a:noAutofit/>
-            </a:bodyPr>
-            <a:lstStyle/>
-            <a:p>
-              <a:pPr indent="0" lvl="0" marL="0" marR="0" rtl="0" algn="ctr">
-                <a:spcBef>
-                  <a:spcPts val="0"/>
-                </a:spcBef>
-                <a:spcAft>
-                  <a:spcPts val="0"/>
-                </a:spcAft>
-                <a:buNone/>
-              </a:pPr>
-              <a:r>
-                <a:t/>
-              </a:r>
-              <a:endParaRPr sz="1800">
-                <a:solidFill>
-                  <a:schemeClr val="lt1"/>
-                </a:solidFill>
-                <a:latin typeface="Calibri"/>
-                <a:ea typeface="Calibri"/>
-                <a:cs typeface="Calibri"/>
-                <a:sym typeface="Calibri"/>
-              </a:endParaRPr>
-            </a:p>
-          </p:txBody>
-        </p:sp>
-        <p:sp>
-          <p:nvSpPr>
-            <p:cNvPr id="302" name="Shape 302"/>
-            <p:cNvSpPr txBox="1"/>
-            <p:nvPr/>
-          </p:nvSpPr>
-          <p:spPr>
-            <a:xfrm>
-              <a:off x="8334000" y="5272175"/>
-              <a:ext cx="942000" cy="276900"/>
-            </a:xfrm>
-            <a:prstGeom prst="rect">
-              <a:avLst/>
-            </a:prstGeom>
-            <a:noFill/>
-            <a:ln>
-              <a:noFill/>
-            </a:ln>
-          </p:spPr>
-          <p:txBody>
-            <a:bodyPr anchorCtr="0" anchor="t" bIns="45700" lIns="91425" spcFirstLastPara="1" rIns="91425" wrap="square" tIns="45700">
-              <a:noAutofit/>
-            </a:bodyPr>
-            <a:lstStyle/>
-            <a:p>
-              <a:pPr indent="0" lvl="0" marL="0" marR="0" rtl="0" algn="l">
-                <a:spcBef>
-                  <a:spcPts val="0"/>
-                </a:spcBef>
-                <a:spcAft>
-                  <a:spcPts val="0"/>
-                </a:spcAft>
-                <a:buNone/>
-              </a:pPr>
-              <a:r>
-                <a:rPr lang="en-US" sz="1200">
-                  <a:solidFill>
-                    <a:schemeClr val="dk1"/>
-                  </a:solidFill>
-                  <a:latin typeface="Calibri"/>
-                  <a:ea typeface="Calibri"/>
-                  <a:cs typeface="Calibri"/>
-                  <a:sym typeface="Calibri"/>
-                </a:rPr>
-                <a:t>Device Agent</a:t>
-              </a:r>
-              <a:endParaRPr sz="1200">
-                <a:solidFill>
-                  <a:schemeClr val="dk1"/>
-                </a:solidFill>
-                <a:latin typeface="Calibri"/>
-                <a:ea typeface="Calibri"/>
-                <a:cs typeface="Calibri"/>
-                <a:sym typeface="Calibri"/>
-              </a:endParaRPr>
-            </a:p>
-          </p:txBody>
-        </p:sp>
-        <p:sp>
-          <p:nvSpPr>
-            <p:cNvPr id="303" name="Shape 303"/>
-            <p:cNvSpPr txBox="1"/>
-            <p:nvPr/>
-          </p:nvSpPr>
-          <p:spPr>
-            <a:xfrm>
-              <a:off x="4068050" y="3021400"/>
-              <a:ext cx="1300800" cy="369300"/>
-            </a:xfrm>
-            <a:prstGeom prst="rect">
-              <a:avLst/>
-            </a:prstGeom>
-            <a:noFill/>
-            <a:ln>
-              <a:noFill/>
-            </a:ln>
-          </p:spPr>
-          <p:txBody>
-            <a:bodyPr anchorCtr="0" anchor="t" bIns="45700" lIns="91425" spcFirstLastPara="1" rIns="91425" wrap="square" tIns="45700">
-              <a:noAutofit/>
-            </a:bodyPr>
-            <a:lstStyle/>
-            <a:p>
-              <a:pPr indent="0" lvl="0" marL="0" marR="0" rtl="0" algn="l">
-                <a:spcBef>
-                  <a:spcPts val="0"/>
-                </a:spcBef>
-                <a:spcAft>
-                  <a:spcPts val="0"/>
-                </a:spcAft>
-                <a:buNone/>
-              </a:pPr>
-              <a:r>
-                <a:rPr lang="en-US">
-                  <a:solidFill>
-                    <a:schemeClr val="dk1"/>
-                  </a:solidFill>
-                  <a:latin typeface="Calibri"/>
-                  <a:ea typeface="Calibri"/>
-                  <a:cs typeface="Calibri"/>
-                  <a:sym typeface="Calibri"/>
-                </a:rPr>
-                <a:t>SDN Agent</a:t>
-              </a:r>
-              <a:endParaRPr>
-                <a:solidFill>
-                  <a:schemeClr val="dk1"/>
-                </a:solidFill>
-                <a:latin typeface="Calibri"/>
-                <a:ea typeface="Calibri"/>
-                <a:cs typeface="Calibri"/>
-                <a:sym typeface="Calibri"/>
-              </a:endParaRPr>
-            </a:p>
-          </p:txBody>
-        </p:sp>
-        <p:pic>
-          <p:nvPicPr>
-            <p:cNvPr id="304" name="Shape 304"/>
-            <p:cNvPicPr preferRelativeResize="0"/>
-            <p:nvPr/>
-          </p:nvPicPr>
-          <p:blipFill>
-            <a:blip r:embed="rId13">
-              <a:alphaModFix/>
-            </a:blip>
-            <a:stretch>
-              <a:fillRect/>
-            </a:stretch>
-          </p:blipFill>
-          <p:spPr>
-            <a:xfrm>
-              <a:off x="3882575" y="2464025"/>
-              <a:ext cx="1357500" cy="410700"/>
-            </a:xfrm>
-            <a:prstGeom prst="rect">
-              <a:avLst/>
-            </a:prstGeom>
-            <a:noFill/>
-            <a:ln>
-              <a:noFill/>
-            </a:ln>
-          </p:spPr>
-        </p:pic>
-        <p:sp>
-          <p:nvSpPr>
-            <p:cNvPr id="305" name="Shape 305"/>
-            <p:cNvSpPr txBox="1"/>
-            <p:nvPr/>
-          </p:nvSpPr>
-          <p:spPr>
-            <a:xfrm>
-              <a:off x="578475" y="5143700"/>
-              <a:ext cx="1156500" cy="276900"/>
-            </a:xfrm>
-            <a:prstGeom prst="rect">
-              <a:avLst/>
-            </a:prstGeom>
-            <a:noFill/>
-            <a:ln>
-              <a:noFill/>
-            </a:ln>
-          </p:spPr>
-          <p:txBody>
-            <a:bodyPr anchorCtr="0" anchor="t" bIns="45700" lIns="91425" spcFirstLastPara="1" rIns="91425" wrap="square" tIns="45700">
-              <a:noAutofit/>
-            </a:bodyPr>
-            <a:lstStyle/>
-            <a:p>
-              <a:pPr indent="0" lvl="0" marL="0" marR="0" rtl="0" algn="l">
-                <a:spcBef>
-                  <a:spcPts val="0"/>
-                </a:spcBef>
-                <a:spcAft>
-                  <a:spcPts val="0"/>
-                </a:spcAft>
-                <a:buNone/>
-              </a:pPr>
-              <a:r>
-                <a:rPr lang="en-US" sz="1200">
-                  <a:solidFill>
-                    <a:schemeClr val="dk1"/>
-                  </a:solidFill>
-                  <a:latin typeface="Calibri"/>
-                  <a:ea typeface="Calibri"/>
-                  <a:cs typeface="Calibri"/>
-                  <a:sym typeface="Calibri"/>
-                </a:rPr>
-                <a:t>MS Application</a:t>
-              </a:r>
-              <a:endParaRPr sz="1200">
-                <a:solidFill>
-                  <a:schemeClr val="dk1"/>
-                </a:solidFill>
-                <a:latin typeface="Calibri"/>
-                <a:ea typeface="Calibri"/>
-                <a:cs typeface="Calibri"/>
-                <a:sym typeface="Calibri"/>
-              </a:endParaRPr>
-            </a:p>
-          </p:txBody>
-        </p:sp>
-        <p:sp>
-          <p:nvSpPr>
-            <p:cNvPr id="306" name="Shape 306"/>
-            <p:cNvSpPr txBox="1"/>
-            <p:nvPr/>
-          </p:nvSpPr>
-          <p:spPr>
-            <a:xfrm>
-              <a:off x="6733800" y="5272175"/>
-              <a:ext cx="942000" cy="276900"/>
-            </a:xfrm>
-            <a:prstGeom prst="rect">
-              <a:avLst/>
-            </a:prstGeom>
-            <a:noFill/>
-            <a:ln>
-              <a:noFill/>
-            </a:ln>
-          </p:spPr>
-          <p:txBody>
-            <a:bodyPr anchorCtr="0" anchor="t" bIns="45700" lIns="91425" spcFirstLastPara="1" rIns="91425" wrap="square" tIns="45700">
-              <a:noAutofit/>
-            </a:bodyPr>
-            <a:lstStyle/>
-            <a:p>
-              <a:pPr indent="0" lvl="0" marL="0" marR="0" rtl="0" algn="l">
-                <a:spcBef>
-                  <a:spcPts val="0"/>
-                </a:spcBef>
-                <a:spcAft>
-                  <a:spcPts val="0"/>
-                </a:spcAft>
-                <a:buNone/>
-              </a:pPr>
-              <a:r>
-                <a:rPr lang="en-US" sz="1200">
-                  <a:solidFill>
-                    <a:schemeClr val="dk1"/>
-                  </a:solidFill>
-                  <a:latin typeface="Calibri"/>
-                  <a:ea typeface="Calibri"/>
-                  <a:cs typeface="Calibri"/>
-                  <a:sym typeface="Calibri"/>
-                </a:rPr>
-                <a:t>Device </a:t>
-              </a:r>
-              <a:r>
-                <a:rPr lang="en-US" sz="1200">
-                  <a:solidFill>
-                    <a:schemeClr val="dk1"/>
-                  </a:solidFill>
-                  <a:latin typeface="Calibri"/>
-                  <a:ea typeface="Calibri"/>
-                  <a:cs typeface="Calibri"/>
-                  <a:sym typeface="Calibri"/>
-                </a:rPr>
-                <a:t>Agent</a:t>
-              </a:r>
-              <a:endParaRPr sz="1200">
-                <a:solidFill>
-                  <a:schemeClr val="dk1"/>
-                </a:solidFill>
-                <a:latin typeface="Calibri"/>
-                <a:ea typeface="Calibri"/>
-                <a:cs typeface="Calibri"/>
-                <a:sym typeface="Calibri"/>
-              </a:endParaRPr>
-            </a:p>
-          </p:txBody>
-        </p:sp>
-        <p:sp>
-          <p:nvSpPr>
-            <p:cNvPr id="307" name="Shape 307"/>
-            <p:cNvSpPr txBox="1"/>
-            <p:nvPr/>
-          </p:nvSpPr>
-          <p:spPr>
-            <a:xfrm>
-              <a:off x="5133600" y="5272175"/>
-              <a:ext cx="942000" cy="276900"/>
-            </a:xfrm>
-            <a:prstGeom prst="rect">
-              <a:avLst/>
-            </a:prstGeom>
-            <a:noFill/>
-            <a:ln>
-              <a:noFill/>
-            </a:ln>
-          </p:spPr>
-          <p:txBody>
-            <a:bodyPr anchorCtr="0" anchor="t" bIns="45700" lIns="91425" spcFirstLastPara="1" rIns="91425" wrap="square" tIns="45700">
-              <a:noAutofit/>
-            </a:bodyPr>
-            <a:lstStyle/>
-            <a:p>
-              <a:pPr indent="0" lvl="0" marL="0" marR="0" rtl="0" algn="l">
-                <a:spcBef>
-                  <a:spcPts val="0"/>
-                </a:spcBef>
-                <a:spcAft>
-                  <a:spcPts val="0"/>
-                </a:spcAft>
-                <a:buNone/>
-              </a:pPr>
-              <a:r>
-                <a:rPr lang="en-US" sz="1200">
-                  <a:solidFill>
-                    <a:schemeClr val="dk1"/>
-                  </a:solidFill>
-                  <a:latin typeface="Calibri"/>
-                  <a:ea typeface="Calibri"/>
-                  <a:cs typeface="Calibri"/>
-                  <a:sym typeface="Calibri"/>
-                </a:rPr>
-                <a:t>Device </a:t>
-              </a:r>
-              <a:r>
-                <a:rPr lang="en-US" sz="1200">
-                  <a:solidFill>
-                    <a:schemeClr val="dk1"/>
-                  </a:solidFill>
-                  <a:latin typeface="Calibri"/>
-                  <a:ea typeface="Calibri"/>
-                  <a:cs typeface="Calibri"/>
-                  <a:sym typeface="Calibri"/>
-                </a:rPr>
-                <a:t> Agent</a:t>
-              </a:r>
-              <a:endParaRPr sz="1200">
-                <a:solidFill>
-                  <a:schemeClr val="dk1"/>
-                </a:solidFill>
-                <a:latin typeface="Calibri"/>
-                <a:ea typeface="Calibri"/>
-                <a:cs typeface="Calibri"/>
-                <a:sym typeface="Calibri"/>
-              </a:endParaRPr>
-            </a:p>
-          </p:txBody>
-        </p:sp>
-        <p:sp>
-          <p:nvSpPr>
-            <p:cNvPr id="308" name="Shape 308"/>
-            <p:cNvSpPr txBox="1"/>
-            <p:nvPr/>
-          </p:nvSpPr>
-          <p:spPr>
-            <a:xfrm>
-              <a:off x="3457200" y="5272175"/>
-              <a:ext cx="867900" cy="276900"/>
-            </a:xfrm>
-            <a:prstGeom prst="rect">
-              <a:avLst/>
-            </a:prstGeom>
-            <a:noFill/>
-            <a:ln>
-              <a:noFill/>
-            </a:ln>
-          </p:spPr>
-          <p:txBody>
-            <a:bodyPr anchorCtr="0" anchor="t" bIns="45700" lIns="91425" spcFirstLastPara="1" rIns="91425" wrap="square" tIns="45700">
-              <a:noAutofit/>
-            </a:bodyPr>
-            <a:lstStyle/>
-            <a:p>
-              <a:pPr indent="0" lvl="0" marL="0" marR="0" rtl="0" algn="l">
-                <a:spcBef>
-                  <a:spcPts val="0"/>
-                </a:spcBef>
-                <a:spcAft>
-                  <a:spcPts val="0"/>
-                </a:spcAft>
-                <a:buNone/>
-              </a:pPr>
-              <a:r>
-                <a:rPr lang="en-US" sz="1200">
-                  <a:solidFill>
-                    <a:schemeClr val="dk1"/>
-                  </a:solidFill>
-                  <a:latin typeface="Calibri"/>
-                  <a:ea typeface="Calibri"/>
-                  <a:cs typeface="Calibri"/>
-                  <a:sym typeface="Calibri"/>
-                </a:rPr>
-                <a:t>Device </a:t>
-              </a:r>
-              <a:r>
-                <a:rPr lang="en-US" sz="1200">
-                  <a:solidFill>
-                    <a:schemeClr val="dk1"/>
-                  </a:solidFill>
-                  <a:latin typeface="Calibri"/>
-                  <a:ea typeface="Calibri"/>
-                  <a:cs typeface="Calibri"/>
-                  <a:sym typeface="Calibri"/>
-                </a:rPr>
-                <a:t>Agent</a:t>
-              </a:r>
-              <a:endParaRPr sz="1200">
-                <a:solidFill>
-                  <a:schemeClr val="dk1"/>
-                </a:solidFill>
-                <a:latin typeface="Calibri"/>
-                <a:ea typeface="Calibri"/>
-                <a:cs typeface="Calibri"/>
-                <a:sym typeface="Calibri"/>
-              </a:endParaRPr>
-            </a:p>
-          </p:txBody>
-        </p:sp>
-        <p:cxnSp>
-          <p:nvCxnSpPr>
-            <p:cNvPr id="309" name="Shape 309"/>
-            <p:cNvCxnSpPr/>
-            <p:nvPr/>
-          </p:nvCxnSpPr>
-          <p:spPr>
-            <a:xfrm>
-              <a:off x="1102125" y="4247475"/>
-              <a:ext cx="11400" cy="308100"/>
-            </a:xfrm>
-            <a:prstGeom prst="straightConnector1">
-              <a:avLst/>
-            </a:prstGeom>
-            <a:noFill/>
-            <a:ln cap="flat" cmpd="sng" w="19050">
-              <a:solidFill>
-                <a:srgbClr val="FF0000"/>
-              </a:solidFill>
-              <a:prstDash val="dash"/>
-              <a:round/>
-              <a:headEnd len="med" w="med" type="none"/>
-              <a:tailEnd len="med" w="med" type="none"/>
-            </a:ln>
-          </p:spPr>
-        </p:cxnSp>
-        <p:cxnSp>
-          <p:nvCxnSpPr>
-            <p:cNvPr id="310" name="Shape 310"/>
-            <p:cNvCxnSpPr/>
-            <p:nvPr/>
-          </p:nvCxnSpPr>
-          <p:spPr>
-            <a:xfrm flipH="1">
-              <a:off x="2886975" y="5698600"/>
-              <a:ext cx="322800" cy="270000"/>
-            </a:xfrm>
-            <a:prstGeom prst="straightConnector1">
-              <a:avLst/>
-            </a:prstGeom>
-            <a:noFill/>
-            <a:ln cap="flat" cmpd="sng" w="19050">
-              <a:solidFill>
-                <a:srgbClr val="FF0000"/>
-              </a:solidFill>
-              <a:prstDash val="dash"/>
-              <a:round/>
-              <a:headEnd len="med" w="med" type="stealth"/>
-              <a:tailEnd len="med" w="med" type="none"/>
-            </a:ln>
-          </p:spPr>
-        </p:cxnSp>
-        <p:cxnSp>
-          <p:nvCxnSpPr>
-            <p:cNvPr id="311" name="Shape 311"/>
-            <p:cNvCxnSpPr>
-              <a:stCxn id="296" idx="2"/>
-            </p:cNvCxnSpPr>
-            <p:nvPr/>
-          </p:nvCxnSpPr>
-          <p:spPr>
-            <a:xfrm flipH="1">
-              <a:off x="4639425" y="5774800"/>
-              <a:ext cx="255300" cy="117600"/>
-            </a:xfrm>
-            <a:prstGeom prst="straightConnector1">
-              <a:avLst/>
-            </a:prstGeom>
-            <a:noFill/>
-            <a:ln cap="flat" cmpd="sng" w="19050">
-              <a:solidFill>
-                <a:srgbClr val="FF0000"/>
-              </a:solidFill>
-              <a:prstDash val="dash"/>
-              <a:round/>
-              <a:headEnd len="med" w="med" type="stealth"/>
-              <a:tailEnd len="med" w="med" type="none"/>
-            </a:ln>
-          </p:spPr>
-        </p:cxnSp>
-        <p:cxnSp>
-          <p:nvCxnSpPr>
-            <p:cNvPr id="312" name="Shape 312"/>
-            <p:cNvCxnSpPr>
-              <a:stCxn id="297" idx="2"/>
-            </p:cNvCxnSpPr>
-            <p:nvPr/>
-          </p:nvCxnSpPr>
-          <p:spPr>
-            <a:xfrm flipH="1">
-              <a:off x="6392288" y="5774800"/>
-              <a:ext cx="148500" cy="270000"/>
-            </a:xfrm>
-            <a:prstGeom prst="straightConnector1">
-              <a:avLst/>
-            </a:prstGeom>
-            <a:noFill/>
-            <a:ln cap="flat" cmpd="sng" w="19050">
-              <a:solidFill>
-                <a:srgbClr val="FF0000"/>
-              </a:solidFill>
-              <a:prstDash val="dash"/>
-              <a:round/>
-              <a:headEnd len="med" w="med" type="stealth"/>
-              <a:tailEnd len="med" w="med" type="none"/>
-            </a:ln>
-          </p:spPr>
-        </p:cxnSp>
-        <p:cxnSp>
-          <p:nvCxnSpPr>
-            <p:cNvPr id="313" name="Shape 313"/>
-            <p:cNvCxnSpPr>
-              <a:stCxn id="298" idx="2"/>
-            </p:cNvCxnSpPr>
-            <p:nvPr/>
-          </p:nvCxnSpPr>
-          <p:spPr>
-            <a:xfrm flipH="1">
-              <a:off x="7710350" y="5752600"/>
-              <a:ext cx="416100" cy="412200"/>
-            </a:xfrm>
-            <a:prstGeom prst="straightConnector1">
-              <a:avLst/>
-            </a:prstGeom>
-            <a:noFill/>
-            <a:ln cap="flat" cmpd="sng" w="19050">
-              <a:solidFill>
-                <a:srgbClr val="FF0000"/>
-              </a:solidFill>
-              <a:prstDash val="dash"/>
-              <a:round/>
-              <a:headEnd len="med" w="med" type="stealth"/>
-              <a:tailEnd len="med" w="med" type="none"/>
-            </a:ln>
-          </p:spPr>
-        </p:cxnSp>
-        <p:cxnSp>
-          <p:nvCxnSpPr>
-            <p:cNvPr id="314" name="Shape 314"/>
-            <p:cNvCxnSpPr/>
-            <p:nvPr/>
-          </p:nvCxnSpPr>
-          <p:spPr>
-            <a:xfrm>
-              <a:off x="5813525" y="2414100"/>
-              <a:ext cx="0" cy="1419000"/>
-            </a:xfrm>
-            <a:prstGeom prst="straightConnector1">
-              <a:avLst/>
-            </a:prstGeom>
-            <a:noFill/>
-            <a:ln cap="flat" cmpd="sng" w="19050">
-              <a:solidFill>
-                <a:srgbClr val="93C47D"/>
-              </a:solidFill>
-              <a:prstDash val="dash"/>
-              <a:round/>
-              <a:headEnd len="med" w="med" type="stealth"/>
-              <a:tailEnd len="med" w="med" type="none"/>
-            </a:ln>
-          </p:spPr>
-        </p:cxnSp>
-        <p:pic>
-          <p:nvPicPr>
-            <p:cNvPr id="315" name="Shape 315"/>
-            <p:cNvPicPr preferRelativeResize="0"/>
-            <p:nvPr/>
-          </p:nvPicPr>
-          <p:blipFill>
-            <a:blip r:embed="rId14">
-              <a:alphaModFix/>
-            </a:blip>
-            <a:stretch>
-              <a:fillRect/>
-            </a:stretch>
-          </p:blipFill>
-          <p:spPr>
-            <a:xfrm>
-              <a:off x="5886825" y="3346700"/>
-              <a:ext cx="665100" cy="410700"/>
-            </a:xfrm>
-            <a:prstGeom prst="rect">
-              <a:avLst/>
-            </a:prstGeom>
-            <a:noFill/>
-            <a:ln>
-              <a:noFill/>
-            </a:ln>
-          </p:spPr>
-        </p:pic>
-        <p:pic>
-          <p:nvPicPr>
-            <p:cNvPr id="316" name="Shape 316"/>
-            <p:cNvPicPr preferRelativeResize="0"/>
-            <p:nvPr/>
-          </p:nvPicPr>
-          <p:blipFill>
-            <a:blip r:embed="rId15">
-              <a:alphaModFix/>
-            </a:blip>
-            <a:stretch>
-              <a:fillRect/>
-            </a:stretch>
-          </p:blipFill>
-          <p:spPr>
-            <a:xfrm>
-              <a:off x="8112375" y="5860001"/>
-              <a:ext cx="450748" cy="450775"/>
-            </a:xfrm>
-            <a:prstGeom prst="rect">
-              <a:avLst/>
-            </a:prstGeom>
-            <a:noFill/>
-            <a:ln>
-              <a:noFill/>
-            </a:ln>
-          </p:spPr>
-        </p:pic>
-        <p:pic>
-          <p:nvPicPr>
-            <p:cNvPr id="317" name="Shape 317"/>
-            <p:cNvPicPr preferRelativeResize="0"/>
-            <p:nvPr/>
-          </p:nvPicPr>
-          <p:blipFill>
-            <a:blip r:embed="rId15">
-              <a:alphaModFix/>
-            </a:blip>
-            <a:stretch>
-              <a:fillRect/>
-            </a:stretch>
-          </p:blipFill>
-          <p:spPr>
-            <a:xfrm>
-              <a:off x="6588375" y="5860001"/>
-              <a:ext cx="450748" cy="450775"/>
-            </a:xfrm>
-            <a:prstGeom prst="rect">
-              <a:avLst/>
-            </a:prstGeom>
-            <a:noFill/>
-            <a:ln>
-              <a:noFill/>
-            </a:ln>
-          </p:spPr>
-        </p:pic>
-        <p:pic>
-          <p:nvPicPr>
-            <p:cNvPr id="318" name="Shape 318"/>
-            <p:cNvPicPr preferRelativeResize="0"/>
-            <p:nvPr/>
-          </p:nvPicPr>
-          <p:blipFill>
-            <a:blip r:embed="rId15">
-              <a:alphaModFix/>
-            </a:blip>
-            <a:stretch>
-              <a:fillRect/>
-            </a:stretch>
-          </p:blipFill>
-          <p:spPr>
-            <a:xfrm>
-              <a:off x="4835775" y="5860001"/>
-              <a:ext cx="450748" cy="450775"/>
-            </a:xfrm>
-            <a:prstGeom prst="rect">
-              <a:avLst/>
-            </a:prstGeom>
-            <a:noFill/>
-            <a:ln>
-              <a:noFill/>
-            </a:ln>
-          </p:spPr>
-        </p:pic>
-        <p:pic>
-          <p:nvPicPr>
-            <p:cNvPr id="319" name="Shape 319"/>
-            <p:cNvPicPr preferRelativeResize="0"/>
-            <p:nvPr/>
-          </p:nvPicPr>
-          <p:blipFill>
-            <a:blip r:embed="rId15">
-              <a:alphaModFix/>
-            </a:blip>
-            <a:stretch>
-              <a:fillRect/>
-            </a:stretch>
-          </p:blipFill>
-          <p:spPr>
-            <a:xfrm>
-              <a:off x="3387975" y="5860001"/>
-              <a:ext cx="450748" cy="450775"/>
-            </a:xfrm>
-            <a:prstGeom prst="rect">
-              <a:avLst/>
-            </a:prstGeom>
-            <a:noFill/>
-            <a:ln>
-              <a:noFill/>
-            </a:ln>
-          </p:spPr>
-        </p:pic>
-        <p:cxnSp>
-          <p:nvCxnSpPr>
-            <p:cNvPr id="320" name="Shape 320"/>
-            <p:cNvCxnSpPr>
-              <a:stCxn id="294" idx="0"/>
-              <a:endCxn id="294" idx="0"/>
-            </p:cNvCxnSpPr>
-            <p:nvPr/>
-          </p:nvCxnSpPr>
-          <p:spPr>
-            <a:xfrm>
-              <a:off x="3209775" y="5212100"/>
-              <a:ext cx="0" cy="0"/>
-            </a:xfrm>
-            <a:prstGeom prst="straightConnector1">
-              <a:avLst/>
-            </a:prstGeom>
-            <a:noFill/>
-            <a:ln cap="flat" cmpd="sng" w="9525">
-              <a:solidFill>
-                <a:schemeClr val="dk2"/>
-              </a:solidFill>
-              <a:prstDash val="solid"/>
-              <a:round/>
-              <a:headEnd len="med" w="med" type="none"/>
-              <a:tailEnd len="med" w="med" type="none"/>
-            </a:ln>
-          </p:spPr>
-        </p:cxnSp>
-        <p:cxnSp>
-          <p:nvCxnSpPr>
-            <p:cNvPr id="321" name="Shape 321"/>
-            <p:cNvCxnSpPr/>
-            <p:nvPr/>
-          </p:nvCxnSpPr>
-          <p:spPr>
-            <a:xfrm>
-              <a:off x="3209775" y="4983500"/>
-              <a:ext cx="0" cy="304800"/>
-            </a:xfrm>
-            <a:prstGeom prst="straightConnector1">
-              <a:avLst/>
-            </a:prstGeom>
-            <a:noFill/>
-            <a:ln cap="flat" cmpd="sng" w="19050">
-              <a:solidFill>
-                <a:srgbClr val="FF0000"/>
-              </a:solidFill>
-              <a:prstDash val="dash"/>
-              <a:round/>
-              <a:headEnd len="med" w="med" type="stealth"/>
-              <a:tailEnd len="med" w="med" type="stealth"/>
-            </a:ln>
-          </p:spPr>
-        </p:cxnSp>
-        <p:cxnSp>
-          <p:nvCxnSpPr>
-            <p:cNvPr id="322" name="Shape 322"/>
-            <p:cNvCxnSpPr/>
-            <p:nvPr/>
-          </p:nvCxnSpPr>
-          <p:spPr>
-            <a:xfrm>
-              <a:off x="4886025" y="4983500"/>
-              <a:ext cx="8700" cy="304800"/>
-            </a:xfrm>
-            <a:prstGeom prst="straightConnector1">
-              <a:avLst/>
-            </a:prstGeom>
-            <a:noFill/>
-            <a:ln cap="flat" cmpd="sng" w="19050">
-              <a:solidFill>
-                <a:srgbClr val="FF0000"/>
-              </a:solidFill>
-              <a:prstDash val="dash"/>
-              <a:round/>
-              <a:headEnd len="med" w="med" type="stealth"/>
-              <a:tailEnd len="med" w="med" type="stealth"/>
-            </a:ln>
-          </p:spPr>
-        </p:cxnSp>
-        <p:cxnSp>
-          <p:nvCxnSpPr>
-            <p:cNvPr id="323" name="Shape 323"/>
-            <p:cNvCxnSpPr/>
-            <p:nvPr/>
-          </p:nvCxnSpPr>
-          <p:spPr>
-            <a:xfrm>
-              <a:off x="6562575" y="4983500"/>
-              <a:ext cx="12300" cy="261300"/>
-            </a:xfrm>
-            <a:prstGeom prst="straightConnector1">
-              <a:avLst/>
-            </a:prstGeom>
-            <a:noFill/>
-            <a:ln cap="flat" cmpd="sng" w="19050">
-              <a:solidFill>
-                <a:srgbClr val="FF0000"/>
-              </a:solidFill>
-              <a:prstDash val="dash"/>
-              <a:round/>
-              <a:headEnd len="med" w="med" type="stealth"/>
-              <a:tailEnd len="med" w="med" type="stealth"/>
-            </a:ln>
-          </p:spPr>
-        </p:cxnSp>
-        <p:cxnSp>
-          <p:nvCxnSpPr>
-            <p:cNvPr id="324" name="Shape 324"/>
-            <p:cNvCxnSpPr/>
-            <p:nvPr/>
-          </p:nvCxnSpPr>
-          <p:spPr>
-            <a:xfrm>
-              <a:off x="8086575" y="4983500"/>
-              <a:ext cx="12300" cy="261300"/>
-            </a:xfrm>
-            <a:prstGeom prst="straightConnector1">
-              <a:avLst/>
-            </a:prstGeom>
-            <a:noFill/>
-            <a:ln cap="flat" cmpd="sng" w="19050">
-              <a:solidFill>
-                <a:srgbClr val="FF0000"/>
-              </a:solidFill>
-              <a:prstDash val="dash"/>
-              <a:round/>
-              <a:headEnd len="med" w="med" type="stealth"/>
-              <a:tailEnd len="med" w="med" type="stealth"/>
-            </a:ln>
-          </p:spPr>
-        </p:cxnSp>
-        <p:cxnSp>
-          <p:nvCxnSpPr>
-            <p:cNvPr id="325" name="Shape 325"/>
-            <p:cNvCxnSpPr/>
-            <p:nvPr/>
-          </p:nvCxnSpPr>
-          <p:spPr>
-            <a:xfrm rot="10800000">
-              <a:off x="3044725" y="4197450"/>
-              <a:ext cx="0" cy="975600"/>
-            </a:xfrm>
-            <a:prstGeom prst="straightConnector1">
-              <a:avLst/>
-            </a:prstGeom>
-            <a:noFill/>
-            <a:ln cap="flat" cmpd="sng" w="19050">
-              <a:solidFill>
-                <a:srgbClr val="6AA84F"/>
-              </a:solidFill>
-              <a:prstDash val="dash"/>
-              <a:round/>
-              <a:headEnd len="med" w="med" type="none"/>
-              <a:tailEnd len="med" w="med" type="none"/>
-            </a:ln>
-          </p:spPr>
-        </p:cxnSp>
-        <p:cxnSp>
-          <p:nvCxnSpPr>
-            <p:cNvPr id="326" name="Shape 326"/>
-            <p:cNvCxnSpPr/>
-            <p:nvPr/>
-          </p:nvCxnSpPr>
-          <p:spPr>
-            <a:xfrm rot="10800000">
-              <a:off x="4721125" y="4197450"/>
-              <a:ext cx="0" cy="975600"/>
-            </a:xfrm>
-            <a:prstGeom prst="straightConnector1">
-              <a:avLst/>
-            </a:prstGeom>
-            <a:noFill/>
-            <a:ln cap="flat" cmpd="sng" w="19050">
-              <a:solidFill>
-                <a:srgbClr val="6AA84F"/>
-              </a:solidFill>
-              <a:prstDash val="dash"/>
-              <a:round/>
-              <a:headEnd len="med" w="med" type="none"/>
-              <a:tailEnd len="med" w="med" type="stealth"/>
-            </a:ln>
-          </p:spPr>
-        </p:cxnSp>
-        <p:cxnSp>
-          <p:nvCxnSpPr>
-            <p:cNvPr id="327" name="Shape 327"/>
-            <p:cNvCxnSpPr/>
-            <p:nvPr/>
-          </p:nvCxnSpPr>
-          <p:spPr>
-            <a:xfrm rot="10800000">
-              <a:off x="6397525" y="4197450"/>
-              <a:ext cx="0" cy="975600"/>
-            </a:xfrm>
-            <a:prstGeom prst="straightConnector1">
-              <a:avLst/>
-            </a:prstGeom>
-            <a:noFill/>
-            <a:ln cap="flat" cmpd="sng" w="19050">
-              <a:solidFill>
-                <a:srgbClr val="6AA84F"/>
-              </a:solidFill>
-              <a:prstDash val="dash"/>
-              <a:round/>
-              <a:headEnd len="med" w="med" type="none"/>
-              <a:tailEnd len="med" w="med" type="stealth"/>
-            </a:ln>
-          </p:spPr>
-        </p:cxnSp>
-        <p:cxnSp>
-          <p:nvCxnSpPr>
-            <p:cNvPr id="328" name="Shape 328"/>
-            <p:cNvCxnSpPr/>
-            <p:nvPr/>
-          </p:nvCxnSpPr>
-          <p:spPr>
-            <a:xfrm rot="10800000">
-              <a:off x="8226325" y="4197450"/>
-              <a:ext cx="0" cy="975600"/>
-            </a:xfrm>
-            <a:prstGeom prst="straightConnector1">
-              <a:avLst/>
-            </a:prstGeom>
-            <a:noFill/>
-            <a:ln cap="flat" cmpd="sng" w="19050">
-              <a:solidFill>
-                <a:srgbClr val="6AA84F"/>
-              </a:solidFill>
-              <a:prstDash val="dash"/>
-              <a:round/>
-              <a:headEnd len="med" w="med" type="none"/>
-              <a:tailEnd len="med" w="med" type="none"/>
-            </a:ln>
-          </p:spPr>
-        </p:cxnSp>
-        <p:cxnSp>
-          <p:nvCxnSpPr>
-            <p:cNvPr id="329" name="Shape 329"/>
-            <p:cNvCxnSpPr/>
-            <p:nvPr/>
-          </p:nvCxnSpPr>
-          <p:spPr>
-            <a:xfrm>
-              <a:off x="3064425" y="4148300"/>
-              <a:ext cx="945900" cy="0"/>
-            </a:xfrm>
-            <a:prstGeom prst="straightConnector1">
-              <a:avLst/>
-            </a:prstGeom>
-            <a:noFill/>
-            <a:ln cap="flat" cmpd="sng" w="19050">
-              <a:solidFill>
-                <a:srgbClr val="6AA84F"/>
-              </a:solidFill>
-              <a:prstDash val="dash"/>
-              <a:round/>
-              <a:headEnd len="med" w="med" type="none"/>
-              <a:tailEnd len="med" w="med" type="stealth"/>
-            </a:ln>
-          </p:spPr>
-        </p:cxnSp>
-        <p:cxnSp>
-          <p:nvCxnSpPr>
-            <p:cNvPr id="330" name="Shape 330"/>
-            <p:cNvCxnSpPr/>
-            <p:nvPr/>
-          </p:nvCxnSpPr>
-          <p:spPr>
-            <a:xfrm rot="10800000">
-              <a:off x="6621375" y="4177850"/>
-              <a:ext cx="1616100" cy="0"/>
-            </a:xfrm>
-            <a:prstGeom prst="straightConnector1">
-              <a:avLst/>
-            </a:prstGeom>
-            <a:noFill/>
-            <a:ln cap="flat" cmpd="sng" w="19050">
-              <a:solidFill>
-                <a:srgbClr val="6AA84F"/>
-              </a:solidFill>
-              <a:prstDash val="dash"/>
-              <a:round/>
-              <a:headEnd len="med" w="med" type="none"/>
-              <a:tailEnd len="med" w="med" type="triangle"/>
-            </a:ln>
-          </p:spPr>
-        </p:cxnSp>
-        <p:pic>
-          <p:nvPicPr>
-            <p:cNvPr id="331" name="Shape 331"/>
-            <p:cNvPicPr preferRelativeResize="0"/>
-            <p:nvPr/>
-          </p:nvPicPr>
-          <p:blipFill>
-            <a:blip r:embed="rId15">
-              <a:alphaModFix/>
-            </a:blip>
-            <a:stretch>
-              <a:fillRect/>
-            </a:stretch>
-          </p:blipFill>
-          <p:spPr>
-            <a:xfrm>
-              <a:off x="1940175" y="4793201"/>
-              <a:ext cx="450748" cy="450775"/>
-            </a:xfrm>
-            <a:prstGeom prst="rect">
-              <a:avLst/>
-            </a:prstGeom>
-            <a:noFill/>
-            <a:ln>
-              <a:noFill/>
-            </a:ln>
-          </p:spPr>
-        </p:pic>
-        <p:cxnSp>
-          <p:nvCxnSpPr>
-            <p:cNvPr id="332" name="Shape 332"/>
-            <p:cNvCxnSpPr/>
-            <p:nvPr/>
-          </p:nvCxnSpPr>
-          <p:spPr>
-            <a:xfrm flipH="1" rot="10800000">
-              <a:off x="2390923" y="5010188"/>
-              <a:ext cx="5698800" cy="8400"/>
-            </a:xfrm>
-            <a:prstGeom prst="straightConnector1">
-              <a:avLst/>
-            </a:prstGeom>
-            <a:noFill/>
-            <a:ln cap="flat" cmpd="sng" w="19050">
-              <a:solidFill>
-                <a:srgbClr val="FF0000"/>
-              </a:solidFill>
-              <a:prstDash val="dash"/>
-              <a:round/>
-              <a:headEnd len="med" w="med" type="stealth"/>
-              <a:tailEnd len="med" w="med" type="none"/>
-            </a:ln>
-          </p:spPr>
-        </p:cxnSp>
-        <p:pic>
-          <p:nvPicPr>
-            <p:cNvPr id="333" name="Shape 333"/>
-            <p:cNvPicPr preferRelativeResize="0"/>
-            <p:nvPr/>
-          </p:nvPicPr>
-          <p:blipFill>
-            <a:blip r:embed="rId14">
-              <a:alphaModFix/>
-            </a:blip>
-            <a:stretch>
-              <a:fillRect/>
-            </a:stretch>
-          </p:blipFill>
-          <p:spPr>
-            <a:xfrm>
-              <a:off x="1543425" y="4184900"/>
-              <a:ext cx="665100" cy="410700"/>
-            </a:xfrm>
-            <a:prstGeom prst="rect">
-              <a:avLst/>
-            </a:prstGeom>
-            <a:noFill/>
-            <a:ln>
-              <a:noFill/>
-            </a:ln>
-          </p:spPr>
-        </p:pic>
-        <p:cxnSp>
-          <p:nvCxnSpPr>
-            <p:cNvPr id="334" name="Shape 334"/>
-            <p:cNvCxnSpPr/>
-            <p:nvPr/>
-          </p:nvCxnSpPr>
-          <p:spPr>
-            <a:xfrm rot="10800000">
-              <a:off x="1645575" y="5010188"/>
-              <a:ext cx="294600" cy="8400"/>
-            </a:xfrm>
-            <a:prstGeom prst="straightConnector1">
-              <a:avLst/>
-            </a:prstGeom>
-            <a:noFill/>
-            <a:ln cap="flat" cmpd="sng" w="19050">
-              <a:solidFill>
-                <a:srgbClr val="FF0000"/>
-              </a:solidFill>
-              <a:prstDash val="dash"/>
-              <a:round/>
-              <a:headEnd len="med" w="med" type="none"/>
-              <a:tailEnd len="med" w="med" type="stealth"/>
-            </a:ln>
-          </p:spPr>
-        </p:cxnSp>
-        <p:cxnSp>
-          <p:nvCxnSpPr>
-            <p:cNvPr id="335" name="Shape 335"/>
-            <p:cNvCxnSpPr/>
-            <p:nvPr/>
-          </p:nvCxnSpPr>
-          <p:spPr>
-            <a:xfrm>
-              <a:off x="1254525" y="4247475"/>
-              <a:ext cx="11400" cy="308100"/>
-            </a:xfrm>
-            <a:prstGeom prst="straightConnector1">
-              <a:avLst/>
-            </a:prstGeom>
-            <a:noFill/>
-            <a:ln cap="flat" cmpd="sng" w="19050">
-              <a:solidFill>
-                <a:srgbClr val="6AA84F"/>
-              </a:solidFill>
-              <a:prstDash val="dash"/>
-              <a:round/>
-              <a:headEnd len="med" w="med" type="none"/>
-              <a:tailEnd len="med" w="med" type="none"/>
-            </a:ln>
-          </p:spPr>
-        </p:cxnSp>
-        <p:pic>
-          <p:nvPicPr>
-            <p:cNvPr id="336" name="Shape 336"/>
-            <p:cNvPicPr preferRelativeResize="0"/>
-            <p:nvPr/>
-          </p:nvPicPr>
-          <p:blipFill>
-            <a:blip r:embed="rId14">
-              <a:alphaModFix/>
-            </a:blip>
-            <a:stretch>
-              <a:fillRect/>
-            </a:stretch>
-          </p:blipFill>
-          <p:spPr>
-            <a:xfrm>
-              <a:off x="8325225" y="4413500"/>
-              <a:ext cx="665100" cy="410700"/>
-            </a:xfrm>
-            <a:prstGeom prst="rect">
-              <a:avLst/>
-            </a:prstGeom>
-            <a:noFill/>
-            <a:ln>
-              <a:noFill/>
-            </a:ln>
-          </p:spPr>
-        </p:pic>
-        <p:cxnSp>
-          <p:nvCxnSpPr>
-            <p:cNvPr id="337" name="Shape 337"/>
-            <p:cNvCxnSpPr>
-              <a:endCxn id="290" idx="0"/>
-            </p:cNvCxnSpPr>
-            <p:nvPr/>
-          </p:nvCxnSpPr>
-          <p:spPr>
-            <a:xfrm flipH="1">
-              <a:off x="2814813" y="4000650"/>
-              <a:ext cx="3300" cy="1778400"/>
-            </a:xfrm>
-            <a:prstGeom prst="straightConnector1">
-              <a:avLst/>
-            </a:prstGeom>
-            <a:noFill/>
-            <a:ln cap="flat" cmpd="sng" w="38100">
-              <a:solidFill>
-                <a:schemeClr val="accent1"/>
-              </a:solidFill>
-              <a:prstDash val="solid"/>
-              <a:miter lim="800000"/>
-              <a:headEnd len="sm" w="sm" type="none"/>
-              <a:tailEnd len="med" w="med" type="triangle"/>
-            </a:ln>
-          </p:spPr>
-        </p:cxnSp>
-        <p:pic>
-          <p:nvPicPr>
-            <p:cNvPr id="338" name="Shape 338"/>
-            <p:cNvPicPr preferRelativeResize="0"/>
-            <p:nvPr/>
-          </p:nvPicPr>
-          <p:blipFill>
-            <a:blip r:embed="rId16">
-              <a:alphaModFix/>
-            </a:blip>
-            <a:stretch>
-              <a:fillRect/>
-            </a:stretch>
-          </p:blipFill>
-          <p:spPr>
-            <a:xfrm>
-              <a:off x="7948975" y="278850"/>
-              <a:ext cx="1189608" cy="622175"/>
-            </a:xfrm>
-            <a:prstGeom prst="rect">
-              <a:avLst/>
-            </a:prstGeom>
-            <a:noFill/>
-            <a:ln>
-              <a:noFill/>
-            </a:ln>
-          </p:spPr>
-        </p:pic>
-        <p:pic>
-          <p:nvPicPr>
-            <p:cNvPr id="339" name="Shape 339"/>
-            <p:cNvPicPr preferRelativeResize="0"/>
-            <p:nvPr/>
-          </p:nvPicPr>
-          <p:blipFill>
-            <a:blip r:embed="rId17">
-              <a:alphaModFix/>
-            </a:blip>
-            <a:stretch>
-              <a:fillRect/>
-            </a:stretch>
-          </p:blipFill>
-          <p:spPr>
-            <a:xfrm>
-              <a:off x="1477425" y="1309083"/>
-              <a:ext cx="1189600" cy="1165818"/>
-            </a:xfrm>
-            <a:prstGeom prst="rect">
-              <a:avLst/>
-            </a:prstGeom>
-            <a:noFill/>
-            <a:ln>
-              <a:noFill/>
-            </a:ln>
-          </p:spPr>
-        </p:pic>
-        <p:sp>
-          <p:nvSpPr>
-            <p:cNvPr id="340" name="Shape 340"/>
-            <p:cNvSpPr txBox="1"/>
-            <p:nvPr/>
-          </p:nvSpPr>
-          <p:spPr>
-            <a:xfrm>
-              <a:off x="1248650" y="2411800"/>
-              <a:ext cx="1966200" cy="369300"/>
-            </a:xfrm>
-            <a:prstGeom prst="rect">
-              <a:avLst/>
-            </a:prstGeom>
-            <a:noFill/>
-            <a:ln>
-              <a:noFill/>
-            </a:ln>
-          </p:spPr>
-          <p:txBody>
-            <a:bodyPr anchorCtr="0" anchor="t" bIns="45700" lIns="91425" spcFirstLastPara="1" rIns="91425" wrap="square" tIns="45700">
-              <a:noAutofit/>
-            </a:bodyPr>
-            <a:lstStyle/>
-            <a:p>
-              <a:pPr indent="0" lvl="0" marL="0" marR="0" rtl="0" algn="l">
-                <a:spcBef>
-                  <a:spcPts val="0"/>
-                </a:spcBef>
-                <a:spcAft>
-                  <a:spcPts val="0"/>
-                </a:spcAft>
-                <a:buNone/>
-              </a:pPr>
-              <a:r>
-                <a:rPr lang="en-US">
-                  <a:solidFill>
-                    <a:schemeClr val="dk1"/>
-                  </a:solidFill>
-                  <a:latin typeface="Calibri"/>
-                  <a:ea typeface="Calibri"/>
-                  <a:cs typeface="Calibri"/>
-                  <a:sym typeface="Calibri"/>
-                </a:rPr>
-                <a:t>     Data Repository</a:t>
-              </a:r>
-              <a:endParaRPr>
-                <a:solidFill>
-                  <a:schemeClr val="dk1"/>
-                </a:solidFill>
-                <a:latin typeface="Calibri"/>
-                <a:ea typeface="Calibri"/>
-                <a:cs typeface="Calibri"/>
-                <a:sym typeface="Calibri"/>
-              </a:endParaRPr>
-            </a:p>
-          </p:txBody>
-        </p:sp>
-        <p:sp>
-          <p:nvSpPr>
-            <p:cNvPr id="341" name="Shape 341"/>
-            <p:cNvSpPr/>
-            <p:nvPr/>
-          </p:nvSpPr>
-          <p:spPr>
-            <a:xfrm>
-              <a:off x="9501800" y="4682050"/>
-              <a:ext cx="2382300" cy="2087100"/>
-            </a:xfrm>
-            <a:prstGeom prst="roundRect">
-              <a:avLst>
-                <a:gd fmla="val 16667" name="adj"/>
-              </a:avLst>
-            </a:prstGeom>
-            <a:noFill/>
-            <a:ln cap="flat" cmpd="sng" w="12700">
-              <a:solidFill>
-                <a:srgbClr val="42719B"/>
-              </a:solidFill>
-              <a:prstDash val="solid"/>
-              <a:miter lim="800000"/>
-              <a:headEnd len="sm" w="sm" type="none"/>
-              <a:tailEnd len="sm" w="sm" type="none"/>
-            </a:ln>
-          </p:spPr>
-          <p:txBody>
-            <a:bodyPr anchorCtr="0" anchor="ctr" bIns="45700" lIns="91425" spcFirstLastPara="1" rIns="91425" wrap="square" tIns="45700">
-              <a:noAutofit/>
-            </a:bodyPr>
-            <a:lstStyle/>
-            <a:p>
-              <a:pPr indent="0" lvl="0" marL="0" marR="0" rtl="0" algn="ctr">
-                <a:spcBef>
-                  <a:spcPts val="0"/>
-                </a:spcBef>
-                <a:spcAft>
-                  <a:spcPts val="0"/>
-                </a:spcAft>
-                <a:buNone/>
-              </a:pPr>
-              <a:r>
-                <a:t/>
-              </a:r>
-              <a:endParaRPr b="0" i="0" sz="1800" u="none" cap="none" strike="noStrike">
-                <a:solidFill>
-                  <a:schemeClr val="lt1"/>
-                </a:solidFill>
-                <a:latin typeface="Calibri"/>
-                <a:ea typeface="Calibri"/>
-                <a:cs typeface="Calibri"/>
-                <a:sym typeface="Calibri"/>
-              </a:endParaRPr>
-            </a:p>
-          </p:txBody>
-        </p:sp>
-        <p:cxnSp>
-          <p:nvCxnSpPr>
-            <p:cNvPr id="342" name="Shape 342"/>
-            <p:cNvCxnSpPr/>
-            <p:nvPr/>
-          </p:nvCxnSpPr>
-          <p:spPr>
-            <a:xfrm>
-              <a:off x="9698425" y="4905050"/>
-              <a:ext cx="560400" cy="5400"/>
-            </a:xfrm>
-            <a:prstGeom prst="straightConnector1">
-              <a:avLst/>
-            </a:prstGeom>
-            <a:noFill/>
-            <a:ln cap="flat" cmpd="sng" w="19050">
-              <a:solidFill>
-                <a:srgbClr val="6AA84F"/>
-              </a:solidFill>
-              <a:prstDash val="dash"/>
-              <a:round/>
-              <a:headEnd len="med" w="med" type="none"/>
-              <a:tailEnd len="med" w="med" type="stealth"/>
-            </a:ln>
-          </p:spPr>
-        </p:cxnSp>
-        <p:cxnSp>
-          <p:nvCxnSpPr>
-            <p:cNvPr id="343" name="Shape 343"/>
-            <p:cNvCxnSpPr/>
-            <p:nvPr/>
-          </p:nvCxnSpPr>
-          <p:spPr>
-            <a:xfrm>
-              <a:off x="9688575" y="5360925"/>
-              <a:ext cx="570000" cy="6600"/>
-            </a:xfrm>
-            <a:prstGeom prst="straightConnector1">
-              <a:avLst/>
-            </a:prstGeom>
-            <a:noFill/>
-            <a:ln cap="flat" cmpd="sng" w="19050">
-              <a:solidFill>
-                <a:srgbClr val="FF0000"/>
-              </a:solidFill>
-              <a:prstDash val="dash"/>
-              <a:round/>
-              <a:headEnd len="med" w="med" type="none"/>
-              <a:tailEnd len="med" w="med" type="stealth"/>
-            </a:ln>
-          </p:spPr>
-        </p:cxnSp>
-        <p:sp>
-          <p:nvSpPr>
-            <p:cNvPr id="344" name="Shape 344"/>
-            <p:cNvSpPr/>
-            <p:nvPr/>
-          </p:nvSpPr>
-          <p:spPr>
-            <a:xfrm rot="5400000">
-              <a:off x="9853352" y="5462525"/>
-              <a:ext cx="163800" cy="532500"/>
-            </a:xfrm>
-            <a:prstGeom prst="upDownArrow">
-              <a:avLst>
-                <a:gd fmla="val 50000" name="adj1"/>
-                <a:gd fmla="val 50000" name="adj2"/>
-              </a:avLst>
-            </a:prstGeom>
-            <a:solidFill>
-              <a:schemeClr val="accent6"/>
-            </a:solidFill>
-            <a:ln cap="flat" cmpd="sng" w="12700">
-              <a:solidFill>
-                <a:srgbClr val="42719B"/>
-              </a:solidFill>
-              <a:prstDash val="solid"/>
-              <a:miter lim="800000"/>
-              <a:headEnd len="sm" w="sm" type="none"/>
-              <a:tailEnd len="sm" w="sm" type="none"/>
-            </a:ln>
-          </p:spPr>
-          <p:txBody>
-            <a:bodyPr anchorCtr="0" anchor="ctr" bIns="45700" lIns="91425" spcFirstLastPara="1" rIns="91425" wrap="square" tIns="45700">
-              <a:noAutofit/>
-            </a:bodyPr>
-            <a:lstStyle/>
-            <a:p>
-              <a:pPr indent="0" lvl="0" marL="0" marR="0" rtl="0" algn="ctr">
-                <a:spcBef>
-                  <a:spcPts val="0"/>
-                </a:spcBef>
-                <a:spcAft>
-                  <a:spcPts val="0"/>
-                </a:spcAft>
-                <a:buNone/>
-              </a:pPr>
-              <a:r>
-                <a:t/>
-              </a:r>
-              <a:endParaRPr sz="1800">
-                <a:solidFill>
-                  <a:schemeClr val="lt1"/>
-                </a:solidFill>
-                <a:latin typeface="Calibri"/>
-                <a:ea typeface="Calibri"/>
-                <a:cs typeface="Calibri"/>
-                <a:sym typeface="Calibri"/>
-              </a:endParaRPr>
-            </a:p>
-          </p:txBody>
-        </p:sp>
-        <p:sp>
-          <p:nvSpPr>
-            <p:cNvPr id="345" name="Shape 345"/>
-            <p:cNvSpPr txBox="1"/>
-            <p:nvPr/>
-          </p:nvSpPr>
-          <p:spPr>
-            <a:xfrm>
-              <a:off x="10337725" y="5083488"/>
-              <a:ext cx="1300800" cy="369300"/>
-            </a:xfrm>
-            <a:prstGeom prst="rect">
-              <a:avLst/>
-            </a:prstGeom>
-            <a:noFill/>
-            <a:ln>
-              <a:noFill/>
-            </a:ln>
-          </p:spPr>
-          <p:txBody>
-            <a:bodyPr anchorCtr="0" anchor="t" bIns="91425" lIns="91425" spcFirstLastPara="1" rIns="91425" wrap="square" tIns="91425">
-              <a:noAutofit/>
-            </a:bodyPr>
-            <a:lstStyle/>
-            <a:p>
-              <a:pPr indent="0" lvl="0" marL="0">
-                <a:spcBef>
-                  <a:spcPts val="0"/>
-                </a:spcBef>
-                <a:spcAft>
-                  <a:spcPts val="0"/>
-                </a:spcAft>
-                <a:buNone/>
-              </a:pPr>
-              <a:r>
-                <a:rPr lang="en-US"/>
-                <a:t>Data Channel</a:t>
-              </a:r>
-              <a:endParaRPr/>
-            </a:p>
-            <a:p>
-              <a:pPr indent="0" lvl="0" marL="0">
-                <a:spcBef>
-                  <a:spcPts val="0"/>
-                </a:spcBef>
-                <a:spcAft>
-                  <a:spcPts val="0"/>
-                </a:spcAft>
-                <a:buNone/>
-              </a:pPr>
-              <a:r>
-                <a:rPr lang="en-US" sz="1000"/>
-                <a:t>(Raw Data)</a:t>
-              </a:r>
-              <a:endParaRPr sz="1000"/>
-            </a:p>
-          </p:txBody>
-        </p:sp>
-        <p:pic>
-          <p:nvPicPr>
-            <p:cNvPr id="346" name="Shape 346"/>
-            <p:cNvPicPr preferRelativeResize="0"/>
-            <p:nvPr/>
-          </p:nvPicPr>
-          <p:blipFill>
-            <a:blip r:embed="rId18">
-              <a:alphaModFix/>
-            </a:blip>
-            <a:stretch>
-              <a:fillRect/>
-            </a:stretch>
-          </p:blipFill>
-          <p:spPr>
-            <a:xfrm rot="10800000">
-              <a:off x="9649144" y="6273300"/>
-              <a:ext cx="619174" cy="450775"/>
-            </a:xfrm>
-            <a:prstGeom prst="rect">
-              <a:avLst/>
-            </a:prstGeom>
-            <a:noFill/>
-            <a:ln>
-              <a:noFill/>
-            </a:ln>
-          </p:spPr>
-        </p:pic>
-        <p:sp>
-          <p:nvSpPr>
-            <p:cNvPr id="347" name="Shape 347"/>
-            <p:cNvSpPr txBox="1"/>
-            <p:nvPr/>
-          </p:nvSpPr>
-          <p:spPr>
-            <a:xfrm>
-              <a:off x="10327600" y="5503075"/>
-              <a:ext cx="1565100" cy="369300"/>
-            </a:xfrm>
-            <a:prstGeom prst="rect">
-              <a:avLst/>
-            </a:prstGeom>
-            <a:noFill/>
-            <a:ln>
-              <a:noFill/>
-            </a:ln>
-          </p:spPr>
-          <p:txBody>
-            <a:bodyPr anchorCtr="0" anchor="t" bIns="91425" lIns="91425" spcFirstLastPara="1" rIns="91425" wrap="square" tIns="91425">
-              <a:noAutofit/>
-            </a:bodyPr>
-            <a:lstStyle/>
-            <a:p>
-              <a:pPr indent="0" lvl="0" marL="0" rtl="0">
-                <a:spcBef>
-                  <a:spcPts val="0"/>
-                </a:spcBef>
-                <a:spcAft>
-                  <a:spcPts val="0"/>
-                </a:spcAft>
-                <a:buNone/>
-              </a:pPr>
-              <a:r>
-                <a:rPr lang="en-US"/>
-                <a:t>Control</a:t>
-              </a:r>
-              <a:r>
-                <a:rPr lang="en-US"/>
-                <a:t> Channel</a:t>
-              </a:r>
-              <a:endParaRPr/>
-            </a:p>
-          </p:txBody>
-        </p:sp>
-        <p:pic>
-          <p:nvPicPr>
-            <p:cNvPr id="348" name="Shape 348"/>
-            <p:cNvPicPr preferRelativeResize="0"/>
-            <p:nvPr/>
-          </p:nvPicPr>
-          <p:blipFill>
-            <a:blip r:embed="rId18">
-              <a:alphaModFix/>
-            </a:blip>
-            <a:stretch>
-              <a:fillRect/>
-            </a:stretch>
-          </p:blipFill>
-          <p:spPr>
-            <a:xfrm>
-              <a:off x="2785575" y="1702025"/>
-              <a:ext cx="1434900" cy="450775"/>
-            </a:xfrm>
-            <a:prstGeom prst="rect">
-              <a:avLst/>
-            </a:prstGeom>
-            <a:noFill/>
-            <a:ln>
-              <a:noFill/>
-            </a:ln>
-          </p:spPr>
-        </p:pic>
-        <p:cxnSp>
-          <p:nvCxnSpPr>
-            <p:cNvPr id="349" name="Shape 349"/>
-            <p:cNvCxnSpPr/>
-            <p:nvPr/>
-          </p:nvCxnSpPr>
-          <p:spPr>
-            <a:xfrm>
-              <a:off x="9636675" y="6089425"/>
-              <a:ext cx="660300" cy="19800"/>
-            </a:xfrm>
-            <a:prstGeom prst="straightConnector1">
-              <a:avLst/>
-            </a:prstGeom>
-            <a:noFill/>
-            <a:ln cap="flat" cmpd="sng" w="38100">
-              <a:solidFill>
-                <a:schemeClr val="accent1"/>
-              </a:solidFill>
-              <a:prstDash val="solid"/>
-              <a:miter lim="800000"/>
-              <a:headEnd len="sm" w="sm" type="none"/>
-              <a:tailEnd len="med" w="med" type="triangle"/>
-            </a:ln>
-          </p:spPr>
-        </p:cxnSp>
-        <p:sp>
-          <p:nvSpPr>
-            <p:cNvPr id="350" name="Shape 350"/>
-            <p:cNvSpPr txBox="1"/>
-            <p:nvPr/>
-          </p:nvSpPr>
-          <p:spPr>
-            <a:xfrm>
-              <a:off x="10353125" y="4663888"/>
-              <a:ext cx="1300800" cy="369300"/>
-            </a:xfrm>
-            <a:prstGeom prst="rect">
-              <a:avLst/>
-            </a:prstGeom>
-            <a:noFill/>
-            <a:ln>
-              <a:noFill/>
-            </a:ln>
-          </p:spPr>
-          <p:txBody>
-            <a:bodyPr anchorCtr="0" anchor="t" bIns="91425" lIns="91425" spcFirstLastPara="1" rIns="91425" wrap="square" tIns="91425">
-              <a:noAutofit/>
-            </a:bodyPr>
-            <a:lstStyle/>
-            <a:p>
-              <a:pPr indent="0" lvl="0" marL="0">
-                <a:spcBef>
-                  <a:spcPts val="0"/>
-                </a:spcBef>
-                <a:spcAft>
-                  <a:spcPts val="0"/>
-                </a:spcAft>
-                <a:buNone/>
-              </a:pPr>
-              <a:r>
-                <a:rPr lang="en-US"/>
-                <a:t>Data Channel</a:t>
-              </a:r>
-              <a:endParaRPr/>
-            </a:p>
-            <a:p>
-              <a:pPr indent="0" lvl="0" marL="0" rtl="0">
-                <a:spcBef>
-                  <a:spcPts val="0"/>
-                </a:spcBef>
-                <a:spcAft>
-                  <a:spcPts val="0"/>
-                </a:spcAft>
-                <a:buNone/>
-              </a:pPr>
-              <a:r>
-                <a:rPr lang="en-US" sz="1000"/>
-                <a:t>(Meaningful Data)</a:t>
-              </a:r>
-              <a:endParaRPr sz="1000"/>
-            </a:p>
-          </p:txBody>
-        </p:sp>
-        <p:sp>
-          <p:nvSpPr>
-            <p:cNvPr id="351" name="Shape 351"/>
-            <p:cNvSpPr txBox="1"/>
-            <p:nvPr/>
-          </p:nvSpPr>
-          <p:spPr>
-            <a:xfrm>
-              <a:off x="10363300" y="5884075"/>
-              <a:ext cx="1300800" cy="369300"/>
-            </a:xfrm>
-            <a:prstGeom prst="rect">
-              <a:avLst/>
-            </a:prstGeom>
-            <a:noFill/>
-            <a:ln>
-              <a:noFill/>
-            </a:ln>
-          </p:spPr>
-          <p:txBody>
-            <a:bodyPr anchorCtr="0" anchor="t" bIns="91425" lIns="91425" spcFirstLastPara="1" rIns="91425" wrap="square" tIns="91425">
-              <a:noAutofit/>
-            </a:bodyPr>
-            <a:lstStyle/>
-            <a:p>
-              <a:pPr indent="0" lvl="0" marL="0" rtl="0">
-                <a:spcBef>
-                  <a:spcPts val="0"/>
-                </a:spcBef>
-                <a:spcAft>
-                  <a:spcPts val="0"/>
-                </a:spcAft>
-                <a:buNone/>
-              </a:pPr>
-              <a:r>
-                <a:rPr lang="en-US"/>
-                <a:t>Network Links</a:t>
-              </a:r>
-              <a:endParaRPr/>
-            </a:p>
-          </p:txBody>
-        </p:sp>
-        <p:pic>
-          <p:nvPicPr>
-            <p:cNvPr id="352" name="Shape 352"/>
-            <p:cNvPicPr preferRelativeResize="0"/>
-            <p:nvPr/>
-          </p:nvPicPr>
-          <p:blipFill>
-            <a:blip r:embed="rId18">
-              <a:alphaModFix/>
-            </a:blip>
-            <a:stretch>
-              <a:fillRect/>
-            </a:stretch>
-          </p:blipFill>
-          <p:spPr>
-            <a:xfrm rot="5400000">
-              <a:off x="5148488" y="1015497"/>
-              <a:ext cx="395450" cy="450775"/>
-            </a:xfrm>
-            <a:prstGeom prst="rect">
-              <a:avLst/>
-            </a:prstGeom>
-            <a:noFill/>
-            <a:ln>
-              <a:noFill/>
-            </a:ln>
-          </p:spPr>
-        </p:pic>
-        <p:sp>
-          <p:nvSpPr>
-            <p:cNvPr id="353" name="Shape 353"/>
-            <p:cNvSpPr txBox="1"/>
-            <p:nvPr/>
-          </p:nvSpPr>
-          <p:spPr>
-            <a:xfrm>
-              <a:off x="10363300" y="6265075"/>
-              <a:ext cx="1565100" cy="369300"/>
-            </a:xfrm>
-            <a:prstGeom prst="rect">
-              <a:avLst/>
-            </a:prstGeom>
-            <a:noFill/>
-            <a:ln>
-              <a:noFill/>
-            </a:ln>
-          </p:spPr>
-          <p:txBody>
-            <a:bodyPr anchorCtr="0" anchor="t" bIns="91425" lIns="91425" spcFirstLastPara="1" rIns="91425" wrap="square" tIns="91425">
-              <a:noAutofit/>
-            </a:bodyPr>
-            <a:lstStyle/>
-            <a:p>
-              <a:pPr indent="0" lvl="0" marL="0" rtl="0">
-                <a:spcBef>
-                  <a:spcPts val="0"/>
-                </a:spcBef>
-                <a:spcAft>
-                  <a:spcPts val="0"/>
-                </a:spcAft>
-                <a:buNone/>
-              </a:pPr>
-              <a:r>
-                <a:rPr lang="en-US"/>
-                <a:t>Processing</a:t>
-              </a:r>
-              <a:r>
-                <a:rPr lang="en-US"/>
-                <a:t> Links</a:t>
-              </a:r>
-              <a:endParaRPr/>
-            </a:p>
-          </p:txBody>
-        </p:sp>
-        <p:pic>
-          <p:nvPicPr>
-            <p:cNvPr id="354" name="Shape 354"/>
-            <p:cNvPicPr preferRelativeResize="0"/>
-            <p:nvPr/>
-          </p:nvPicPr>
-          <p:blipFill>
-            <a:blip r:embed="rId19">
-              <a:alphaModFix/>
-            </a:blip>
-            <a:stretch>
-              <a:fillRect/>
-            </a:stretch>
-          </p:blipFill>
-          <p:spPr>
-            <a:xfrm>
-              <a:off x="4819425" y="1779325"/>
-              <a:ext cx="1064175" cy="261300"/>
-            </a:xfrm>
-            <a:prstGeom prst="rect">
-              <a:avLst/>
-            </a:prstGeom>
-            <a:noFill/>
-            <a:ln>
-              <a:noFill/>
-            </a:ln>
-          </p:spPr>
-        </p:pic>
-        <p:pic>
-          <p:nvPicPr>
-            <p:cNvPr id="355" name="Shape 355"/>
-            <p:cNvPicPr preferRelativeResize="0"/>
-            <p:nvPr/>
-          </p:nvPicPr>
-          <p:blipFill>
-            <a:blip r:embed="rId20">
-              <a:alphaModFix/>
-            </a:blip>
-            <a:stretch>
-              <a:fillRect/>
-            </a:stretch>
-          </p:blipFill>
-          <p:spPr>
-            <a:xfrm>
-              <a:off x="4809650" y="2123750"/>
-              <a:ext cx="1064176" cy="304800"/>
-            </a:xfrm>
-            <a:prstGeom prst="rect">
-              <a:avLst/>
-            </a:prstGeom>
-            <a:noFill/>
-            <a:ln>
-              <a:noFill/>
-            </a:ln>
-          </p:spPr>
-        </p:pic>
-        <p:cxnSp>
-          <p:nvCxnSpPr>
-            <p:cNvPr id="356" name="Shape 356"/>
-            <p:cNvCxnSpPr/>
-            <p:nvPr/>
-          </p:nvCxnSpPr>
-          <p:spPr>
-            <a:xfrm flipH="1" rot="10800000">
-              <a:off x="4553938" y="1698475"/>
-              <a:ext cx="1545600" cy="7200"/>
-            </a:xfrm>
-            <a:prstGeom prst="straightConnector1">
-              <a:avLst/>
-            </a:prstGeom>
-            <a:noFill/>
-            <a:ln cap="flat" cmpd="sng" w="9525">
-              <a:solidFill>
-                <a:srgbClr val="000000"/>
-              </a:solidFill>
-              <a:prstDash val="solid"/>
-              <a:round/>
-              <a:headEnd len="med" w="med" type="none"/>
-              <a:tailEnd len="med" w="med" type="none"/>
-            </a:ln>
-          </p:spPr>
-        </p:cxnSp>
-        <p:sp>
-          <p:nvSpPr>
-            <p:cNvPr id="357" name="Shape 357"/>
-            <p:cNvSpPr txBox="1"/>
-            <p:nvPr/>
-          </p:nvSpPr>
-          <p:spPr>
-            <a:xfrm>
-              <a:off x="5439650" y="1116400"/>
-              <a:ext cx="1434900" cy="308100"/>
-            </a:xfrm>
-            <a:prstGeom prst="rect">
-              <a:avLst/>
-            </a:prstGeom>
-            <a:noFill/>
-            <a:ln>
-              <a:noFill/>
-            </a:ln>
-          </p:spPr>
-          <p:txBody>
-            <a:bodyPr anchorCtr="0" anchor="t" bIns="45700" lIns="91425" spcFirstLastPara="1" rIns="91425" wrap="square" tIns="45700">
-              <a:noAutofit/>
-            </a:bodyPr>
-            <a:lstStyle/>
-            <a:p>
-              <a:pPr indent="0" lvl="0" marL="0" marR="0" rtl="0" algn="l">
-                <a:spcBef>
-                  <a:spcPts val="0"/>
-                </a:spcBef>
-                <a:spcAft>
-                  <a:spcPts val="0"/>
-                </a:spcAft>
-                <a:buNone/>
-              </a:pPr>
-              <a:r>
-                <a:rPr lang="en-US" sz="1100">
-                  <a:solidFill>
-                    <a:schemeClr val="dk1"/>
-                  </a:solidFill>
-                  <a:latin typeface="Calibri"/>
-                  <a:ea typeface="Calibri"/>
-                  <a:cs typeface="Calibri"/>
-                  <a:sym typeface="Calibri"/>
-                </a:rPr>
-                <a:t>RESTCONF/NETCONF</a:t>
-              </a:r>
-              <a:endParaRPr sz="1100">
-                <a:solidFill>
-                  <a:schemeClr val="dk1"/>
-                </a:solidFill>
-                <a:latin typeface="Calibri"/>
-                <a:ea typeface="Calibri"/>
-                <a:cs typeface="Calibri"/>
-                <a:sym typeface="Calibri"/>
-              </a:endParaRPr>
-            </a:p>
-          </p:txBody>
-        </p:sp>
-        <p:pic>
-          <p:nvPicPr>
-            <p:cNvPr id="358" name="Shape 358"/>
-            <p:cNvPicPr preferRelativeResize="0"/>
-            <p:nvPr/>
-          </p:nvPicPr>
-          <p:blipFill>
-            <a:blip r:embed="rId21">
-              <a:alphaModFix/>
-            </a:blip>
-            <a:stretch>
-              <a:fillRect/>
-            </a:stretch>
-          </p:blipFill>
-          <p:spPr>
-            <a:xfrm>
-              <a:off x="9590850" y="121025"/>
-              <a:ext cx="1898525" cy="759410"/>
-            </a:xfrm>
-            <a:prstGeom prst="rect">
-              <a:avLst/>
-            </a:prstGeom>
-            <a:noFill/>
-            <a:ln>
-              <a:noFill/>
-            </a:ln>
-          </p:spPr>
-        </p:pic>
-      </p:grpSp>
+              <a:highlight>
+                <a:srgbClr val="FFFFFF"/>
+              </a:highlight>
+              <a:latin typeface="Calibri"/>
+              <a:ea typeface="Calibri"/>
+              <a:cs typeface="Calibri"/>
+              <a:sym typeface="Calibri"/>
+            </a:endParaRPr>
+          </a:p>
+          <a:p>
+            <a:pPr indent="0" lvl="0" marL="0">
+              <a:spcBef>
+                <a:spcPts val="0"/>
+              </a:spcBef>
+              <a:spcAft>
+                <a:spcPts val="0"/>
+              </a:spcAft>
+              <a:buNone/>
+            </a:pPr>
+            <a:r>
+              <a:t/>
+            </a:r>
+            <a:endParaRPr/>
+          </a:p>
+        </p:txBody>
+      </p:sp>
     </p:spTree>
   </p:cSld>
   <p:clrMapOvr>
@@ -30060,34 +26759,34 @@
         <a:srgbClr val="FFFFFF"/>
       </a:lt1>
       <a:dk2>
-        <a:srgbClr val="1F497D"/>
+        <a:srgbClr val="44546A"/>
       </a:dk2>
       <a:lt2>
-        <a:srgbClr val="EEECE1"/>
+        <a:srgbClr val="E7E6E6"/>
       </a:lt2>
       <a:accent1>
-        <a:srgbClr val="4F81BD"/>
+        <a:srgbClr val="5B9BD5"/>
       </a:accent1>
       <a:accent2>
-        <a:srgbClr val="C0504D"/>
+        <a:srgbClr val="ED7D31"/>
       </a:accent2>
       <a:accent3>
-        <a:srgbClr val="9BBB59"/>
+        <a:srgbClr val="A5A5A5"/>
       </a:accent3>
       <a:accent4>
-        <a:srgbClr val="8064A2"/>
+        <a:srgbClr val="FFC000"/>
       </a:accent4>
       <a:accent5>
-        <a:srgbClr val="4BACC6"/>
+        <a:srgbClr val="4472C4"/>
       </a:accent5>
       <a:accent6>
-        <a:srgbClr val="F79646"/>
+        <a:srgbClr val="70AD47"/>
       </a:accent6>
       <a:hlink>
-        <a:srgbClr val="0000FF"/>
+        <a:srgbClr val="0563C1"/>
       </a:hlink>
       <a:folHlink>
-        <a:srgbClr val="800080"/>
+        <a:srgbClr val="954F72"/>
       </a:folHlink>
     </a:clrScheme>
     <a:fontScheme name="Office">
@@ -30618,34 +27317,34 @@
         <a:srgbClr val="FFFFFF"/>
       </a:lt1>
       <a:dk2>
-        <a:srgbClr val="44546A"/>
+        <a:srgbClr val="1F497D"/>
       </a:dk2>
       <a:lt2>
-        <a:srgbClr val="E7E6E6"/>
+        <a:srgbClr val="EEECE1"/>
       </a:lt2>
       <a:accent1>
-        <a:srgbClr val="5B9BD5"/>
+        <a:srgbClr val="4F81BD"/>
       </a:accent1>
       <a:accent2>
-        <a:srgbClr val="ED7D31"/>
+        <a:srgbClr val="C0504D"/>
       </a:accent2>
       <a:accent3>
-        <a:srgbClr val="A5A5A5"/>
+        <a:srgbClr val="9BBB59"/>
       </a:accent3>
       <a:accent4>
-        <a:srgbClr val="FFC000"/>
+        <a:srgbClr val="8064A2"/>
       </a:accent4>
       <a:accent5>
-        <a:srgbClr val="4472C4"/>
+        <a:srgbClr val="4BACC6"/>
       </a:accent5>
       <a:accent6>
-        <a:srgbClr val="70AD47"/>
+        <a:srgbClr val="F79646"/>
       </a:accent6>
       <a:hlink>
-        <a:srgbClr val="0563C1"/>
+        <a:srgbClr val="0000FF"/>
       </a:hlink>
       <a:folHlink>
-        <a:srgbClr val="954F72"/>
+        <a:srgbClr val="800080"/>
       </a:folHlink>
     </a:clrScheme>
     <a:fontScheme name="Office">

</xml_diff>